<commit_message>
Continued work expanding slides and projects
</commit_message>
<xml_diff>
--- a/EvolveYourCode.pptx
+++ b/EvolveYourCode.pptx
@@ -24,19 +24,32 @@
     <p:sldId id="272" r:id="rId18"/>
     <p:sldId id="273" r:id="rId19"/>
     <p:sldId id="274" r:id="rId20"/>
-    <p:sldId id="277" r:id="rId21"/>
-    <p:sldId id="279" r:id="rId22"/>
+    <p:sldId id="298" r:id="rId21"/>
+    <p:sldId id="277" r:id="rId22"/>
     <p:sldId id="282" r:id="rId23"/>
     <p:sldId id="283" r:id="rId24"/>
-    <p:sldId id="284" r:id="rId25"/>
-    <p:sldId id="285" r:id="rId26"/>
-    <p:sldId id="286" r:id="rId27"/>
-    <p:sldId id="287" r:id="rId28"/>
-    <p:sldId id="288" r:id="rId29"/>
-    <p:sldId id="278" r:id="rId30"/>
-    <p:sldId id="281" r:id="rId31"/>
-    <p:sldId id="257" r:id="rId32"/>
-    <p:sldId id="259" r:id="rId33"/>
+    <p:sldId id="299" r:id="rId25"/>
+    <p:sldId id="284" r:id="rId26"/>
+    <p:sldId id="285" r:id="rId27"/>
+    <p:sldId id="286" r:id="rId28"/>
+    <p:sldId id="295" r:id="rId29"/>
+    <p:sldId id="287" r:id="rId30"/>
+    <p:sldId id="300" r:id="rId31"/>
+    <p:sldId id="288" r:id="rId32"/>
+    <p:sldId id="296" r:id="rId33"/>
+    <p:sldId id="297" r:id="rId34"/>
+    <p:sldId id="301" r:id="rId35"/>
+    <p:sldId id="290" r:id="rId36"/>
+    <p:sldId id="289" r:id="rId37"/>
+    <p:sldId id="293" r:id="rId38"/>
+    <p:sldId id="294" r:id="rId39"/>
+    <p:sldId id="279" r:id="rId40"/>
+    <p:sldId id="292" r:id="rId41"/>
+    <p:sldId id="278" r:id="rId42"/>
+    <p:sldId id="291" r:id="rId43"/>
+    <p:sldId id="281" r:id="rId44"/>
+    <p:sldId id="257" r:id="rId45"/>
+    <p:sldId id="259" r:id="rId46"/>
   </p:sldIdLst>
   <p:sldSz cx="9144000" cy="6858000" type="screen4x3"/>
   <p:notesSz cx="6858000" cy="9144000"/>
@@ -2570,9 +2583,26 @@
 <p:sldMaster xmlns:a="http://schemas.openxmlformats.org/drawingml/2006/main" xmlns:r="http://schemas.openxmlformats.org/officeDocument/2006/relationships" xmlns:p="http://schemas.openxmlformats.org/presentationml/2006/main">
   <p:cSld>
     <p:bg>
-      <p:bgRef idx="1001">
-        <a:schemeClr val="bg1"/>
-      </p:bgRef>
+      <p:bgPr>
+        <a:gradFill flip="none" rotWithShape="1">
+          <a:gsLst>
+            <a:gs pos="0">
+              <a:schemeClr val="bg1">
+                <a:lumMod val="75000"/>
+                <a:lumOff val="25000"/>
+              </a:schemeClr>
+            </a:gs>
+            <a:gs pos="100000">
+              <a:schemeClr val="bg1"/>
+            </a:gs>
+          </a:gsLst>
+          <a:path path="circle">
+            <a:fillToRect l="50000" t="50000" r="50000" b="50000"/>
+          </a:path>
+          <a:tileRect/>
+        </a:gradFill>
+        <a:effectLst/>
+      </p:bgPr>
     </p:bg>
     <p:spTree>
       <p:nvGrpSpPr>
@@ -2806,7 +2836,7 @@
       </p:sp>
     </p:spTree>
   </p:cSld>
-  <p:clrMap bg1="lt1" tx1="dk1" bg2="lt2" tx2="dk2" accent1="accent1" accent2="accent2" accent3="accent3" accent4="accent4" accent5="accent5" accent6="accent6" hlink="hlink" folHlink="folHlink"/>
+  <p:clrMap bg1="dk1" tx1="lt1" bg2="dk2" tx2="lt2" accent1="accent1" accent2="accent2" accent3="accent3" accent4="accent4" accent5="accent5" accent6="accent6" hlink="hlink" folHlink="folHlink"/>
   <p:sldLayoutIdLst>
     <p:sldLayoutId id="2147483649" r:id="rId1"/>
     <p:sldLayoutId id="2147483650" r:id="rId2"/>
@@ -3238,6 +3268,13 @@
   <p:clrMapOvr>
     <a:masterClrMapping/>
   </p:clrMapOvr>
+  <p:timing>
+    <p:tnLst>
+      <p:par>
+        <p:cTn id="1" dur="indefinite" restart="never" nodeType="tmRoot"/>
+      </p:par>
+    </p:tnLst>
+  </p:timing>
 </p:sld>
 </file>
 
@@ -3515,6 +3552,13 @@
   <p:clrMapOvr>
     <a:masterClrMapping/>
   </p:clrMapOvr>
+  <p:timing>
+    <p:tnLst>
+      <p:par>
+        <p:cTn id="1" dur="indefinite" restart="never" nodeType="tmRoot"/>
+      </p:par>
+    </p:tnLst>
+  </p:timing>
 </p:sld>
 </file>
 
@@ -3742,6 +3786,13 @@
   <p:clrMapOvr>
     <a:masterClrMapping/>
   </p:clrMapOvr>
+  <p:timing>
+    <p:tnLst>
+      <p:par>
+        <p:cTn id="1" dur="indefinite" restart="never" nodeType="tmRoot"/>
+      </p:par>
+    </p:tnLst>
+  </p:timing>
 </p:sld>
 </file>
 
@@ -3877,6 +3928,13 @@
   <p:clrMapOvr>
     <a:masterClrMapping/>
   </p:clrMapOvr>
+  <p:timing>
+    <p:tnLst>
+      <p:par>
+        <p:cTn id="1" dur="indefinite" restart="never" nodeType="tmRoot"/>
+      </p:par>
+    </p:tnLst>
+  </p:timing>
 </p:sld>
 </file>
 
@@ -4133,6 +4191,13 @@
   <p:clrMapOvr>
     <a:masterClrMapping/>
   </p:clrMapOvr>
+  <p:timing>
+    <p:tnLst>
+      <p:par>
+        <p:cTn id="1" dur="indefinite" restart="never" nodeType="tmRoot"/>
+      </p:par>
+    </p:tnLst>
+  </p:timing>
 </p:sld>
 </file>
 
@@ -4785,31 +4850,44 @@
           <a:p>
             <a:r>
               <a:rPr lang="en-US" dirty="0" smtClean="0"/>
-              <a:t>WPF Notify property change demo</a:t>
+              <a:t>1 + 1</a:t>
             </a:r>
             <a:endParaRPr lang="en-US" dirty="0"/>
           </a:p>
         </p:txBody>
       </p:sp>
-      <p:sp>
-        <p:nvSpPr>
-          <p:cNvPr id="3" name="Text Placeholder 2"/>
-          <p:cNvSpPr>
-            <a:spLocks noGrp="1"/>
-          </p:cNvSpPr>
-          <p:nvPr>
-            <p:ph type="body" idx="1"/>
-          </p:nvPr>
-        </p:nvSpPr>
-        <p:spPr/>
-        <p:txBody>
-          <a:bodyPr/>
-          <a:lstStyle/>
-          <a:p>
-            <a:endParaRPr lang="en-US"/>
-          </a:p>
-        </p:txBody>
-      </p:sp>
+      <p:pic>
+        <p:nvPicPr>
+          <p:cNvPr id="4098" name="Picture 2"/>
+          <p:cNvPicPr>
+            <a:picLocks noChangeAspect="1" noChangeArrowheads="1"/>
+          </p:cNvPicPr>
+          <p:nvPr/>
+        </p:nvPicPr>
+        <p:blipFill>
+          <a:blip r:embed="rId2" cstate="print"/>
+          <a:srcRect/>
+          <a:stretch>
+            <a:fillRect/>
+          </a:stretch>
+        </p:blipFill>
+        <p:spPr bwMode="auto">
+          <a:xfrm>
+            <a:off x="533400" y="1600200"/>
+            <a:ext cx="8028264" cy="2514600"/>
+          </a:xfrm>
+          <a:prstGeom prst="rect">
+            <a:avLst/>
+          </a:prstGeom>
+          <a:noFill/>
+          <a:ln w="9525">
+            <a:noFill/>
+            <a:miter lim="800000"/>
+            <a:headEnd/>
+            <a:tailEnd/>
+          </a:ln>
+        </p:spPr>
+      </p:pic>
     </p:spTree>
   </p:cSld>
   <p:clrMapOvr>
@@ -4851,16 +4929,8 @@
           <a:lstStyle/>
           <a:p>
             <a:r>
-              <a:rPr lang="en-US" dirty="0" err="1" smtClean="0"/>
-              <a:t>Poco</a:t>
-            </a:r>
-            <a:r>
-              <a:rPr lang="en-US" dirty="0" smtClean="0"/>
-              <a:t> Entity Framework </a:t>
-            </a:r>
-            <a:r>
-              <a:rPr lang="en-US" dirty="0" err="1" smtClean="0"/>
-              <a:t>poc</a:t>
+              <a:rPr lang="en-US" dirty="0" smtClean="0"/>
+              <a:t>WPF Notify property change demo</a:t>
             </a:r>
             <a:endParaRPr lang="en-US" dirty="0"/>
           </a:p>
@@ -5025,53 +5095,39 @@
             </a:r>
             <a:r>
               <a:rPr lang="en-US" dirty="0" smtClean="0"/>
-              <a:t> (as first coined by </a:t>
-            </a:r>
-            <a:r>
-              <a:rPr lang="en-US" dirty="0" smtClean="0">
-                <a:hlinkClick r:id="rId2" tooltip="Eric Evans (technologist) (page does not exist)"/>
-              </a:rPr>
-              <a:t>Eric Evans</a:t>
-            </a:r>
-            <a:r>
-              <a:rPr lang="en-US" dirty="0" smtClean="0"/>
-              <a:t> and </a:t>
-            </a:r>
-            <a:r>
-              <a:rPr lang="en-US" dirty="0" smtClean="0">
-                <a:hlinkClick r:id="rId3" tooltip="Martin Fowler"/>
-              </a:rPr>
-              <a:t>Martin Fowler</a:t>
-            </a:r>
-            <a:r>
-              <a:rPr lang="en-US" dirty="0" smtClean="0"/>
-              <a:t>) is a way of implementing an </a:t>
-            </a:r>
-            <a:r>
-              <a:rPr lang="en-US" dirty="0" smtClean="0">
-                <a:hlinkClick r:id="rId4" tooltip="Object oriented design"/>
-              </a:rPr>
-              <a:t>object oriented</a:t>
-            </a:r>
-            <a:r>
-              <a:rPr lang="en-US" dirty="0" smtClean="0"/>
-              <a:t> API in a way that aims to provide for more readable code.</a:t>
-            </a:r>
-          </a:p>
-          <a:p>
-            <a:r>
-              <a:rPr lang="en-US" dirty="0" smtClean="0"/>
-              <a:t> A fluent interface is normally implemented by using </a:t>
-            </a:r>
-            <a:r>
-              <a:rPr lang="en-US" dirty="0" smtClean="0">
-                <a:hlinkClick r:id="rId5" tooltip="Method chaining"/>
-              </a:rPr>
-              <a:t>method chaining</a:t>
-            </a:r>
-            <a:r>
-              <a:rPr lang="en-US" dirty="0" smtClean="0"/>
-              <a:t> to relay the instruction context of a subsequent call</a:t>
+              <a:t> </a:t>
+            </a:r>
+            <a:r>
+              <a:rPr lang="en-US" dirty="0" smtClean="0"/>
+              <a:t>is </a:t>
+            </a:r>
+            <a:r>
+              <a:rPr lang="en-US" dirty="0" smtClean="0"/>
+              <a:t>a way of implementing an object oriented API in a way that aims to provide for more readable code.</a:t>
+            </a:r>
+          </a:p>
+          <a:p>
+            <a:r>
+              <a:rPr lang="en-US" dirty="0" smtClean="0"/>
+              <a:t> A fluent interface is normally implemented by using method chaining to relay the instruction context of a subsequent </a:t>
+            </a:r>
+            <a:r>
+              <a:rPr lang="en-US" dirty="0" smtClean="0"/>
+              <a:t>call</a:t>
+            </a:r>
+          </a:p>
+          <a:p>
+            <a:r>
+              <a:rPr lang="en-US" dirty="0" smtClean="0"/>
+              <a:t>Term coined </a:t>
+            </a:r>
+            <a:r>
+              <a:rPr lang="en-US" dirty="0" smtClean="0"/>
+              <a:t>by Eric Evans and Martin </a:t>
+            </a:r>
+            <a:r>
+              <a:rPr lang="en-US" dirty="0" smtClean="0"/>
+              <a:t>Fowler</a:t>
             </a:r>
             <a:endParaRPr lang="en-US" dirty="0"/>
           </a:p>
@@ -5119,7 +5175,92 @@
           <a:p>
             <a:r>
               <a:rPr lang="en-US" dirty="0" smtClean="0"/>
-              <a:t>Where – Structure Map</a:t>
+              <a:t>All the rage…</a:t>
+            </a:r>
+            <a:endParaRPr lang="en-US" dirty="0"/>
+          </a:p>
+        </p:txBody>
+      </p:sp>
+      <p:sp>
+        <p:nvSpPr>
+          <p:cNvPr id="3" name="Content Placeholder 2"/>
+          <p:cNvSpPr>
+            <a:spLocks noGrp="1"/>
+          </p:cNvSpPr>
+          <p:nvPr>
+            <p:ph idx="1"/>
+          </p:nvPr>
+        </p:nvSpPr>
+        <p:spPr/>
+        <p:txBody>
+          <a:bodyPr/>
+          <a:lstStyle/>
+          <a:p>
+            <a:r>
+              <a:rPr lang="en-US" dirty="0" smtClean="0"/>
+              <a:t>Many frameworks now offer fluent interfaces for configuration and ease of use</a:t>
+            </a:r>
+          </a:p>
+          <a:p>
+            <a:r>
+              <a:rPr lang="en-US" dirty="0" smtClean="0"/>
+              <a:t>Let’s </a:t>
+            </a:r>
+            <a:r>
+              <a:rPr lang="en-US" dirty="0" smtClean="0"/>
+              <a:t>look at some samples</a:t>
+            </a:r>
+            <a:endParaRPr lang="en-US" dirty="0"/>
+          </a:p>
+        </p:txBody>
+      </p:sp>
+    </p:spTree>
+  </p:cSld>
+  <p:clrMapOvr>
+    <a:masterClrMapping/>
+  </p:clrMapOvr>
+</p:sld>
+</file>
+
+<file path=ppt/slides/slide25.xml><?xml version="1.0" encoding="utf-8"?>
+<p:sld xmlns:a="http://schemas.openxmlformats.org/drawingml/2006/main" xmlns:r="http://schemas.openxmlformats.org/officeDocument/2006/relationships" xmlns:p="http://schemas.openxmlformats.org/presentationml/2006/main">
+  <p:cSld>
+    <p:spTree>
+      <p:nvGrpSpPr>
+        <p:cNvPr id="1" name=""/>
+        <p:cNvGrpSpPr/>
+        <p:nvPr/>
+      </p:nvGrpSpPr>
+      <p:grpSpPr>
+        <a:xfrm>
+          <a:off x="0" y="0"/>
+          <a:ext cx="0" cy="0"/>
+          <a:chOff x="0" y="0"/>
+          <a:chExt cx="0" cy="0"/>
+        </a:xfrm>
+      </p:grpSpPr>
+      <p:sp>
+        <p:nvSpPr>
+          <p:cNvPr id="2" name="Title 1"/>
+          <p:cNvSpPr>
+            <a:spLocks noGrp="1"/>
+          </p:cNvSpPr>
+          <p:nvPr>
+            <p:ph type="title"/>
+          </p:nvPr>
+        </p:nvSpPr>
+        <p:spPr/>
+        <p:txBody>
+          <a:bodyPr/>
+          <a:lstStyle/>
+          <a:p>
+            <a:r>
+              <a:rPr lang="en-US" dirty="0" smtClean="0"/>
+              <a:t>Structure </a:t>
+            </a:r>
+            <a:r>
+              <a:rPr lang="en-US" dirty="0" smtClean="0"/>
+              <a:t>Map</a:t>
             </a:r>
             <a:endParaRPr lang="en-US" dirty="0"/>
           </a:p>
@@ -5166,7 +5307,7 @@
 </p:sld>
 </file>
 
-<file path=ppt/slides/slide25.xml><?xml version="1.0" encoding="utf-8"?>
+<file path=ppt/slides/slide26.xml><?xml version="1.0" encoding="utf-8"?>
 <p:sld xmlns:a="http://schemas.openxmlformats.org/drawingml/2006/main" xmlns:r="http://schemas.openxmlformats.org/officeDocument/2006/relationships" xmlns:p="http://schemas.openxmlformats.org/presentationml/2006/main">
   <p:cSld>
     <p:spTree>
@@ -5200,7 +5341,7 @@
           <a:p>
             <a:r>
               <a:rPr lang="en-US" dirty="0" smtClean="0"/>
-              <a:t>Where – Fluent </a:t>
+              <a:t>Fluent </a:t>
             </a:r>
             <a:r>
               <a:rPr lang="en-US" dirty="0" err="1" smtClean="0"/>
@@ -5284,73 +5425,6 @@
 </p:sld>
 </file>
 
-<file path=ppt/slides/slide26.xml><?xml version="1.0" encoding="utf-8"?>
-<p:sld xmlns:a="http://schemas.openxmlformats.org/drawingml/2006/main" xmlns:r="http://schemas.openxmlformats.org/officeDocument/2006/relationships" xmlns:p="http://schemas.openxmlformats.org/presentationml/2006/main">
-  <p:cSld>
-    <p:spTree>
-      <p:nvGrpSpPr>
-        <p:cNvPr id="1" name=""/>
-        <p:cNvGrpSpPr/>
-        <p:nvPr/>
-      </p:nvGrpSpPr>
-      <p:grpSpPr>
-        <a:xfrm>
-          <a:off x="0" y="0"/>
-          <a:ext cx="0" cy="0"/>
-          <a:chOff x="0" y="0"/>
-          <a:chExt cx="0" cy="0"/>
-        </a:xfrm>
-      </p:grpSpPr>
-      <p:sp>
-        <p:nvSpPr>
-          <p:cNvPr id="2" name="Title 1"/>
-          <p:cNvSpPr>
-            <a:spLocks noGrp="1"/>
-          </p:cNvSpPr>
-          <p:nvPr>
-            <p:ph type="title"/>
-          </p:nvPr>
-        </p:nvSpPr>
-        <p:spPr/>
-        <p:txBody>
-          <a:bodyPr/>
-          <a:lstStyle/>
-          <a:p>
-            <a:r>
-              <a:rPr lang="en-US" dirty="0" smtClean="0"/>
-              <a:t>Where – Open Rasta</a:t>
-            </a:r>
-            <a:endParaRPr lang="en-US" dirty="0"/>
-          </a:p>
-        </p:txBody>
-      </p:sp>
-      <p:sp>
-        <p:nvSpPr>
-          <p:cNvPr id="3" name="Content Placeholder 2"/>
-          <p:cNvSpPr>
-            <a:spLocks noGrp="1"/>
-          </p:cNvSpPr>
-          <p:nvPr>
-            <p:ph idx="1"/>
-          </p:nvPr>
-        </p:nvSpPr>
-        <p:spPr/>
-        <p:txBody>
-          <a:bodyPr/>
-          <a:lstStyle/>
-          <a:p>
-            <a:endParaRPr lang="en-US"/>
-          </a:p>
-        </p:txBody>
-      </p:sp>
-    </p:spTree>
-  </p:cSld>
-  <p:clrMapOvr>
-    <a:masterClrMapping/>
-  </p:clrMapOvr>
-</p:sld>
-</file>
-
 <file path=ppt/slides/slide27.xml><?xml version="1.0" encoding="utf-8"?>
 <p:sld xmlns:a="http://schemas.openxmlformats.org/drawingml/2006/main" xmlns:r="http://schemas.openxmlformats.org/officeDocument/2006/relationships" xmlns:p="http://schemas.openxmlformats.org/presentationml/2006/main">
   <p:cSld>
@@ -5385,7 +5459,11 @@
           <a:p>
             <a:r>
               <a:rPr lang="en-US" dirty="0" smtClean="0"/>
-              <a:t>When to use Fluent Interfaces</a:t>
+              <a:t>Open </a:t>
+            </a:r>
+            <a:r>
+              <a:rPr lang="en-US" dirty="0" smtClean="0"/>
+              <a:t>Rasta</a:t>
             </a:r>
             <a:endParaRPr lang="en-US" dirty="0"/>
           </a:p>
@@ -5406,42 +5484,7 @@
           <a:bodyPr/>
           <a:lstStyle/>
           <a:p>
-            <a:r>
-              <a:rPr lang="en-US" dirty="0" smtClean="0"/>
-              <a:t>To turn complex operations into readable </a:t>
-            </a:r>
-          </a:p>
-          <a:p>
-            <a:pPr lvl="1"/>
-            <a:r>
-              <a:rPr lang="en-US" dirty="0" smtClean="0"/>
-              <a:t>Configuration is complex, notice all 3 examples were configuring a component</a:t>
-            </a:r>
-          </a:p>
-          <a:p>
-            <a:r>
-              <a:rPr lang="en-US" dirty="0" smtClean="0"/>
-              <a:t>Packaging Functionality</a:t>
-            </a:r>
-          </a:p>
-          <a:p>
-            <a:r>
-              <a:rPr lang="en-US" dirty="0" smtClean="0"/>
-              <a:t>Builders</a:t>
-            </a:r>
-          </a:p>
-          <a:p>
-            <a:r>
-              <a:rPr lang="en-US" dirty="0" smtClean="0"/>
-              <a:t>Configuration</a:t>
-            </a:r>
-          </a:p>
-          <a:p>
-            <a:r>
-              <a:rPr lang="en-US" dirty="0" smtClean="0"/>
-              <a:t>Utilities</a:t>
-            </a:r>
-            <a:endParaRPr lang="en-US" dirty="0"/>
+            <a:endParaRPr lang="en-US"/>
           </a:p>
         </p:txBody>
       </p:sp>
@@ -5486,13 +5529,45 @@
           <a:lstStyle/>
           <a:p>
             <a:r>
-              <a:rPr lang="en-US" dirty="0" smtClean="0"/>
-              <a:t>How</a:t>
+              <a:rPr lang="en-US" dirty="0" err="1" smtClean="0"/>
+              <a:t>NBuilder</a:t>
             </a:r>
             <a:endParaRPr lang="en-US" dirty="0"/>
           </a:p>
         </p:txBody>
       </p:sp>
+      <p:pic>
+        <p:nvPicPr>
+          <p:cNvPr id="1026" name="Picture 2"/>
+          <p:cNvPicPr>
+            <a:picLocks noChangeAspect="1" noChangeArrowheads="1"/>
+          </p:cNvPicPr>
+          <p:nvPr/>
+        </p:nvPicPr>
+        <p:blipFill>
+          <a:blip r:embed="rId2" cstate="print"/>
+          <a:srcRect/>
+          <a:stretch>
+            <a:fillRect/>
+          </a:stretch>
+        </p:blipFill>
+        <p:spPr bwMode="auto">
+          <a:xfrm>
+            <a:off x="1524000" y="1600200"/>
+            <a:ext cx="6236677" cy="2286000"/>
+          </a:xfrm>
+          <a:prstGeom prst="rect">
+            <a:avLst/>
+          </a:prstGeom>
+          <a:noFill/>
+          <a:ln w="9525">
+            <a:noFill/>
+            <a:miter lim="800000"/>
+            <a:headEnd/>
+            <a:tailEnd/>
+          </a:ln>
+        </p:spPr>
+      </p:pic>
     </p:spTree>
   </p:cSld>
   <p:clrMapOvr>
@@ -5535,7 +5610,7 @@
           <a:p>
             <a:r>
               <a:rPr lang="en-US" dirty="0" smtClean="0"/>
-              <a:t>Resources</a:t>
+              <a:t>When to use Fluent Interfaces</a:t>
             </a:r>
             <a:endParaRPr lang="en-US" dirty="0"/>
           </a:p>
@@ -5553,34 +5628,44 @@
         </p:nvSpPr>
         <p:spPr/>
         <p:txBody>
-          <a:bodyPr/>
-          <a:lstStyle/>
-          <a:p>
-            <a:r>
-              <a:rPr lang="en-US" dirty="0" smtClean="0"/>
-              <a:t>MSDN (too many links to list)</a:t>
-            </a:r>
-          </a:p>
-          <a:p>
-            <a:r>
-              <a:rPr lang="en-US" dirty="0" smtClean="0"/>
-              <a:t>J.P. Hamilton</a:t>
-            </a:r>
-          </a:p>
-          <a:p>
-            <a:pPr lvl="1"/>
-            <a:r>
-              <a:rPr lang="en-US" dirty="0" smtClean="0">
-                <a:hlinkClick r:id="rId2"/>
-              </a:rPr>
-              <a:t>http://www.jphamilton.net/post/MVVM-with-Type-Safe-INotifyPropertyChanged.aspx</a:t>
+          <a:bodyPr>
+            <a:normAutofit/>
+          </a:bodyPr>
+          <a:lstStyle/>
+          <a:p>
+            <a:r>
+              <a:rPr lang="en-US" dirty="0" smtClean="0"/>
+              <a:t>To turn complex operations into </a:t>
+            </a:r>
+            <a:r>
+              <a:rPr lang="en-US" dirty="0" smtClean="0"/>
+              <a:t>readable ones </a:t>
             </a:r>
             <a:endParaRPr lang="en-US" dirty="0" smtClean="0"/>
           </a:p>
           <a:p>
             <a:r>
               <a:rPr lang="en-US" dirty="0" smtClean="0"/>
-              <a:t>Wikipedia</a:t>
+              <a:t>Packaging Functionality</a:t>
+            </a:r>
+          </a:p>
+          <a:p>
+            <a:r>
+              <a:rPr lang="en-US" dirty="0" smtClean="0"/>
+              <a:t>Builders</a:t>
+            </a:r>
+            <a:endParaRPr lang="en-US" dirty="0" smtClean="0"/>
+          </a:p>
+          <a:p>
+            <a:r>
+              <a:rPr lang="en-US" dirty="0" smtClean="0"/>
+              <a:t>Configuration</a:t>
+            </a:r>
+          </a:p>
+          <a:p>
+            <a:r>
+              <a:rPr lang="en-US" dirty="0" smtClean="0"/>
+              <a:t>Utilities</a:t>
             </a:r>
             <a:endParaRPr lang="en-US" dirty="0"/>
           </a:p>
@@ -5727,7 +5812,7 @@
           <a:p>
             <a:r>
               <a:rPr lang="en-US" dirty="0" smtClean="0"/>
-              <a:t>MISC SLIDES</a:t>
+              <a:t>Pros &amp; Cons</a:t>
             </a:r>
             <a:endParaRPr lang="en-US" dirty="0"/>
           </a:p>
@@ -5735,20 +5820,55 @@
       </p:sp>
       <p:sp>
         <p:nvSpPr>
-          <p:cNvPr id="3" name="Text Placeholder 2"/>
-          <p:cNvSpPr>
-            <a:spLocks noGrp="1"/>
-          </p:cNvSpPr>
-          <p:nvPr>
-            <p:ph type="body" idx="1"/>
-          </p:nvPr>
-        </p:nvSpPr>
-        <p:spPr/>
-        <p:txBody>
-          <a:bodyPr/>
-          <a:lstStyle/>
-          <a:p>
-            <a:endParaRPr lang="en-US"/>
+          <p:cNvPr id="3" name="Content Placeholder 2"/>
+          <p:cNvSpPr>
+            <a:spLocks noGrp="1"/>
+          </p:cNvSpPr>
+          <p:nvPr>
+            <p:ph idx="1"/>
+          </p:nvPr>
+        </p:nvSpPr>
+        <p:spPr/>
+        <p:txBody>
+          <a:bodyPr/>
+          <a:lstStyle/>
+          <a:p>
+            <a:r>
+              <a:rPr lang="en-US" dirty="0" smtClean="0"/>
+              <a:t>Pros</a:t>
+            </a:r>
+          </a:p>
+          <a:p>
+            <a:pPr lvl="1"/>
+            <a:r>
+              <a:rPr lang="en-US" dirty="0" smtClean="0"/>
+              <a:t>Easy to read</a:t>
+            </a:r>
+          </a:p>
+          <a:p>
+            <a:pPr lvl="1"/>
+            <a:r>
+              <a:rPr lang="en-US" dirty="0" err="1" smtClean="0"/>
+              <a:t>Intellisense</a:t>
+            </a:r>
+            <a:r>
+              <a:rPr lang="en-US" dirty="0" smtClean="0"/>
+              <a:t> exposes functionality</a:t>
+            </a:r>
+          </a:p>
+          <a:p>
+            <a:r>
+              <a:rPr lang="en-US" dirty="0" smtClean="0"/>
+              <a:t>Cons</a:t>
+            </a:r>
+          </a:p>
+          <a:p>
+            <a:pPr lvl="1"/>
+            <a:r>
+              <a:rPr lang="en-US" dirty="0" smtClean="0"/>
+              <a:t>Difficult to set a breakpoint / debug</a:t>
+            </a:r>
+            <a:endParaRPr lang="en-US" dirty="0"/>
           </a:p>
         </p:txBody>
       </p:sp>
@@ -5794,7 +5914,7 @@
           <a:p>
             <a:r>
               <a:rPr lang="en-US" dirty="0" smtClean="0"/>
-              <a:t>Lambda Outline</a:t>
+              <a:t>Is it an API or a DSL?</a:t>
             </a:r>
             <a:endParaRPr lang="en-US" dirty="0"/>
           </a:p>
@@ -5802,76 +5922,47 @@
       </p:sp>
       <p:sp>
         <p:nvSpPr>
-          <p:cNvPr id="3" name="Content Placeholder 2"/>
-          <p:cNvSpPr>
-            <a:spLocks noGrp="1"/>
-          </p:cNvSpPr>
-          <p:nvPr>
-            <p:ph idx="1"/>
-          </p:nvPr>
-        </p:nvSpPr>
-        <p:spPr/>
-        <p:txBody>
-          <a:bodyPr/>
-          <a:lstStyle/>
-          <a:p>
-            <a:pPr fontAlgn="ctr"/>
-            <a:r>
-              <a:rPr lang="en-US" dirty="0"/>
-              <a:t>Lambda Expressions</a:t>
-            </a:r>
-            <a:endParaRPr lang="en-US" dirty="0" smtClean="0"/>
-          </a:p>
-          <a:p>
-            <a:pPr lvl="1" fontAlgn="ctr"/>
-            <a:r>
-              <a:rPr lang="en-US" dirty="0"/>
-              <a:t>What are they</a:t>
-            </a:r>
-            <a:endParaRPr lang="en-US" dirty="0" smtClean="0"/>
-          </a:p>
-          <a:p>
-            <a:pPr lvl="1" fontAlgn="ctr"/>
-            <a:r>
-              <a:rPr lang="en-US" dirty="0" err="1"/>
-              <a:t>Linq</a:t>
-            </a:r>
-            <a:endParaRPr lang="en-US" dirty="0" smtClean="0"/>
-          </a:p>
-          <a:p>
-            <a:pPr lvl="1" fontAlgn="ctr"/>
-            <a:r>
-              <a:rPr lang="en-US" dirty="0"/>
-              <a:t>WPF Notify Property Change example</a:t>
-            </a:r>
-            <a:endParaRPr lang="en-US" dirty="0" smtClean="0"/>
-          </a:p>
-          <a:p>
-            <a:pPr lvl="1" fontAlgn="ctr"/>
-            <a:r>
-              <a:rPr lang="en-US" dirty="0"/>
-              <a:t>Delegate Commands</a:t>
-            </a:r>
-            <a:endParaRPr lang="en-US" dirty="0" smtClean="0"/>
-          </a:p>
-          <a:p>
-            <a:pPr lvl="1" fontAlgn="ctr"/>
-            <a:r>
-              <a:rPr lang="en-US" dirty="0"/>
-              <a:t>Event Handlers</a:t>
-            </a:r>
-            <a:endParaRPr lang="en-US" dirty="0" smtClean="0"/>
-          </a:p>
-          <a:p>
-            <a:pPr lvl="1" fontAlgn="ctr"/>
-            <a:r>
-              <a:rPr lang="en-US" dirty="0"/>
-              <a:t>EF Example</a:t>
-            </a:r>
-            <a:endParaRPr lang="en-US" dirty="0" smtClean="0"/>
-          </a:p>
-          <a:p>
-            <a:endParaRPr lang="en-US" dirty="0"/>
+          <p:cNvPr id="3" name="TextBox 2"/>
+          <p:cNvSpPr txBox="1"/>
+          <p:nvPr/>
+        </p:nvSpPr>
+        <p:spPr>
+          <a:xfrm>
+            <a:off x="457200" y="1828800"/>
+            <a:ext cx="7772400" cy="1754326"/>
+          </a:xfrm>
+          <a:prstGeom prst="rect">
+            <a:avLst/>
+          </a:prstGeom>
+          <a:noFill/>
+        </p:spPr>
+        <p:txBody>
+          <a:bodyPr wrap="square" rtlCol="0">
+            <a:spAutoFit/>
+          </a:bodyPr>
+          <a:lstStyle/>
+          <a:p>
+            <a:r>
+              <a:rPr lang="en-US" sz="3600" i="1" dirty="0" smtClean="0"/>
+              <a:t>Whether </a:t>
+            </a:r>
+            <a:r>
+              <a:rPr lang="en-US" sz="3600" i="1" dirty="0" smtClean="0"/>
+              <a:t>fluent interface is a form of DSL or not, it's obviously a form of fluent interface</a:t>
+            </a:r>
+            <a:r>
+              <a:rPr lang="en-US" sz="3600" i="1" dirty="0" smtClean="0"/>
+              <a:t>. - </a:t>
+            </a:r>
+            <a:r>
+              <a:rPr lang="en-US" sz="3600" i="1" dirty="0" smtClean="0"/>
+              <a:t>Scott </a:t>
+            </a:r>
+            <a:r>
+              <a:rPr lang="en-US" sz="3600" i="1" dirty="0" err="1" smtClean="0"/>
+              <a:t>Bellware</a:t>
+            </a:r>
+            <a:endParaRPr lang="en-US" sz="3600" dirty="0"/>
           </a:p>
         </p:txBody>
       </p:sp>
@@ -5917,12 +6008,744 @@
           <a:p>
             <a:r>
               <a:rPr lang="en-US" dirty="0" smtClean="0"/>
-              <a:t>Fluent Interface</a:t>
+              <a:t>Add Example</a:t>
             </a:r>
             <a:endParaRPr lang="en-US" dirty="0"/>
           </a:p>
         </p:txBody>
       </p:sp>
+      <p:pic>
+        <p:nvPicPr>
+          <p:cNvPr id="2050" name="Picture 2"/>
+          <p:cNvPicPr>
+            <a:picLocks noChangeAspect="1" noChangeArrowheads="1"/>
+          </p:cNvPicPr>
+          <p:nvPr/>
+        </p:nvPicPr>
+        <p:blipFill>
+          <a:blip r:embed="rId2" cstate="print"/>
+          <a:srcRect/>
+          <a:stretch>
+            <a:fillRect/>
+          </a:stretch>
+        </p:blipFill>
+        <p:spPr bwMode="auto">
+          <a:xfrm>
+            <a:off x="381000" y="2209800"/>
+            <a:ext cx="2952750" cy="552450"/>
+          </a:xfrm>
+          <a:prstGeom prst="rect">
+            <a:avLst/>
+          </a:prstGeom>
+          <a:noFill/>
+          <a:ln w="9525">
+            <a:noFill/>
+            <a:miter lim="800000"/>
+            <a:headEnd/>
+            <a:tailEnd/>
+          </a:ln>
+        </p:spPr>
+      </p:pic>
+      <p:sp>
+        <p:nvSpPr>
+          <p:cNvPr id="5" name="TextBox 4"/>
+          <p:cNvSpPr txBox="1"/>
+          <p:nvPr/>
+        </p:nvSpPr>
+        <p:spPr>
+          <a:xfrm>
+            <a:off x="228600" y="1295400"/>
+            <a:ext cx="2864951" cy="369332"/>
+          </a:xfrm>
+          <a:prstGeom prst="rect">
+            <a:avLst/>
+          </a:prstGeom>
+          <a:noFill/>
+        </p:spPr>
+        <p:txBody>
+          <a:bodyPr wrap="none" rtlCol="0">
+            <a:spAutoFit/>
+          </a:bodyPr>
+          <a:lstStyle/>
+          <a:p>
+            <a:r>
+              <a:rPr lang="en-US" dirty="0" smtClean="0"/>
+              <a:t>Adding items to a </a:t>
+            </a:r>
+            <a:r>
+              <a:rPr lang="en-US" dirty="0" err="1" smtClean="0"/>
+              <a:t>combobox</a:t>
+            </a:r>
+            <a:endParaRPr lang="en-US" dirty="0"/>
+          </a:p>
+        </p:txBody>
+      </p:sp>
+      <p:pic>
+        <p:nvPicPr>
+          <p:cNvPr id="2051" name="Picture 3"/>
+          <p:cNvPicPr>
+            <a:picLocks noChangeAspect="1" noChangeArrowheads="1"/>
+          </p:cNvPicPr>
+          <p:nvPr/>
+        </p:nvPicPr>
+        <p:blipFill>
+          <a:blip r:embed="rId3" cstate="print"/>
+          <a:srcRect/>
+          <a:stretch>
+            <a:fillRect/>
+          </a:stretch>
+        </p:blipFill>
+        <p:spPr bwMode="auto">
+          <a:xfrm>
+            <a:off x="3962400" y="1295400"/>
+            <a:ext cx="4962525" cy="4467225"/>
+          </a:xfrm>
+          <a:prstGeom prst="rect">
+            <a:avLst/>
+          </a:prstGeom>
+          <a:noFill/>
+          <a:ln w="9525">
+            <a:noFill/>
+            <a:miter lim="800000"/>
+            <a:headEnd/>
+            <a:tailEnd/>
+          </a:ln>
+        </p:spPr>
+      </p:pic>
+      <p:pic>
+        <p:nvPicPr>
+          <p:cNvPr id="2052" name="Picture 4"/>
+          <p:cNvPicPr>
+            <a:picLocks noChangeAspect="1" noChangeArrowheads="1"/>
+          </p:cNvPicPr>
+          <p:nvPr/>
+        </p:nvPicPr>
+        <p:blipFill>
+          <a:blip r:embed="rId4" cstate="print"/>
+          <a:srcRect/>
+          <a:stretch>
+            <a:fillRect/>
+          </a:stretch>
+        </p:blipFill>
+        <p:spPr bwMode="auto">
+          <a:xfrm>
+            <a:off x="304800" y="4724400"/>
+            <a:ext cx="3581400" cy="333375"/>
+          </a:xfrm>
+          <a:prstGeom prst="rect">
+            <a:avLst/>
+          </a:prstGeom>
+          <a:noFill/>
+          <a:ln w="9525">
+            <a:noFill/>
+            <a:miter lim="800000"/>
+            <a:headEnd/>
+            <a:tailEnd/>
+          </a:ln>
+        </p:spPr>
+      </p:pic>
+      <p:sp>
+        <p:nvSpPr>
+          <p:cNvPr id="8" name="Right Arrow 7"/>
+          <p:cNvSpPr/>
+          <p:nvPr/>
+        </p:nvSpPr>
+        <p:spPr>
+          <a:xfrm rot="5400000">
+            <a:off x="495300" y="3543300"/>
+            <a:ext cx="1752600" cy="457200"/>
+          </a:xfrm>
+          <a:prstGeom prst="rightArrow">
+            <a:avLst/>
+          </a:prstGeom>
+        </p:spPr>
+        <p:style>
+          <a:lnRef idx="2">
+            <a:schemeClr val="accent1">
+              <a:shade val="50000"/>
+            </a:schemeClr>
+          </a:lnRef>
+          <a:fillRef idx="1">
+            <a:schemeClr val="accent1"/>
+          </a:fillRef>
+          <a:effectRef idx="0">
+            <a:schemeClr val="accent1"/>
+          </a:effectRef>
+          <a:fontRef idx="minor">
+            <a:schemeClr val="lt1"/>
+          </a:fontRef>
+        </p:style>
+        <p:txBody>
+          <a:bodyPr rtlCol="0" anchor="ctr"/>
+          <a:lstStyle/>
+          <a:p>
+            <a:pPr algn="ctr"/>
+            <a:endParaRPr lang="en-US"/>
+          </a:p>
+        </p:txBody>
+      </p:sp>
+      <p:sp>
+        <p:nvSpPr>
+          <p:cNvPr id="9" name="TextBox 8"/>
+          <p:cNvSpPr txBox="1"/>
+          <p:nvPr/>
+        </p:nvSpPr>
+        <p:spPr>
+          <a:xfrm>
+            <a:off x="1600200" y="3124200"/>
+            <a:ext cx="1754070" cy="369332"/>
+          </a:xfrm>
+          <a:prstGeom prst="rect">
+            <a:avLst/>
+          </a:prstGeom>
+          <a:noFill/>
+        </p:spPr>
+        <p:txBody>
+          <a:bodyPr wrap="none" rtlCol="0">
+            <a:spAutoFit/>
+          </a:bodyPr>
+          <a:lstStyle/>
+          <a:p>
+            <a:r>
+              <a:rPr lang="en-US" dirty="0" smtClean="0"/>
+              <a:t>Now it turns to…</a:t>
+            </a:r>
+            <a:endParaRPr lang="en-US" dirty="0"/>
+          </a:p>
+        </p:txBody>
+      </p:sp>
+      <p:sp>
+        <p:nvSpPr>
+          <p:cNvPr id="10" name="TextBox 9"/>
+          <p:cNvSpPr txBox="1"/>
+          <p:nvPr/>
+        </p:nvSpPr>
+        <p:spPr>
+          <a:xfrm>
+            <a:off x="228600" y="1752600"/>
+            <a:ext cx="3326039" cy="369332"/>
+          </a:xfrm>
+          <a:prstGeom prst="rect">
+            <a:avLst/>
+          </a:prstGeom>
+          <a:noFill/>
+        </p:spPr>
+        <p:txBody>
+          <a:bodyPr wrap="none" rtlCol="0">
+            <a:spAutoFit/>
+          </a:bodyPr>
+          <a:lstStyle/>
+          <a:p>
+            <a:r>
+              <a:rPr lang="en-US" dirty="0" smtClean="0"/>
+              <a:t>This is what we see everywhere…</a:t>
+            </a:r>
+            <a:endParaRPr lang="en-US" dirty="0"/>
+          </a:p>
+        </p:txBody>
+      </p:sp>
+      <p:sp>
+        <p:nvSpPr>
+          <p:cNvPr id="11" name="TextBox 10"/>
+          <p:cNvSpPr txBox="1"/>
+          <p:nvPr/>
+        </p:nvSpPr>
+        <p:spPr>
+          <a:xfrm>
+            <a:off x="304800" y="5105400"/>
+            <a:ext cx="3581400" cy="923330"/>
+          </a:xfrm>
+          <a:prstGeom prst="rect">
+            <a:avLst/>
+          </a:prstGeom>
+          <a:noFill/>
+        </p:spPr>
+        <p:txBody>
+          <a:bodyPr wrap="square" rtlCol="0">
+            <a:spAutoFit/>
+          </a:bodyPr>
+          <a:lstStyle/>
+          <a:p>
+            <a:r>
+              <a:rPr lang="en-US" dirty="0" smtClean="0"/>
+              <a:t>And we now can manage how items are adding to </a:t>
+            </a:r>
+            <a:r>
+              <a:rPr lang="en-US" dirty="0" err="1" smtClean="0"/>
+              <a:t>comboboxes</a:t>
+            </a:r>
+            <a:r>
+              <a:rPr lang="en-US" dirty="0" smtClean="0"/>
+              <a:t> for the entire solution</a:t>
+            </a:r>
+            <a:endParaRPr lang="en-US" dirty="0"/>
+          </a:p>
+        </p:txBody>
+      </p:sp>
+    </p:spTree>
+  </p:cSld>
+  <p:clrMapOvr>
+    <a:masterClrMapping/>
+  </p:clrMapOvr>
+</p:sld>
+</file>
+
+<file path=ppt/slides/slide33.xml><?xml version="1.0" encoding="utf-8"?>
+<p:sld xmlns:a="http://schemas.openxmlformats.org/drawingml/2006/main" xmlns:r="http://schemas.openxmlformats.org/officeDocument/2006/relationships" xmlns:p="http://schemas.openxmlformats.org/presentationml/2006/main">
+  <p:cSld>
+    <p:spTree>
+      <p:nvGrpSpPr>
+        <p:cNvPr id="1" name=""/>
+        <p:cNvGrpSpPr/>
+        <p:nvPr/>
+      </p:nvGrpSpPr>
+      <p:grpSpPr>
+        <a:xfrm>
+          <a:off x="0" y="0"/>
+          <a:ext cx="0" cy="0"/>
+          <a:chOff x="0" y="0"/>
+          <a:chExt cx="0" cy="0"/>
+        </a:xfrm>
+      </p:grpSpPr>
+      <p:pic>
+        <p:nvPicPr>
+          <p:cNvPr id="3076" name="Picture 4"/>
+          <p:cNvPicPr>
+            <a:picLocks noChangeAspect="1" noChangeArrowheads="1"/>
+          </p:cNvPicPr>
+          <p:nvPr/>
+        </p:nvPicPr>
+        <p:blipFill>
+          <a:blip r:embed="rId2" cstate="print"/>
+          <a:srcRect/>
+          <a:stretch>
+            <a:fillRect/>
+          </a:stretch>
+        </p:blipFill>
+        <p:spPr bwMode="auto">
+          <a:xfrm>
+            <a:off x="228600" y="2209800"/>
+            <a:ext cx="3981450" cy="1352550"/>
+          </a:xfrm>
+          <a:prstGeom prst="rect">
+            <a:avLst/>
+          </a:prstGeom>
+          <a:noFill/>
+          <a:ln w="9525">
+            <a:noFill/>
+            <a:miter lim="800000"/>
+            <a:headEnd/>
+            <a:tailEnd/>
+          </a:ln>
+        </p:spPr>
+      </p:pic>
+      <p:sp>
+        <p:nvSpPr>
+          <p:cNvPr id="2" name="Title 1"/>
+          <p:cNvSpPr>
+            <a:spLocks noGrp="1"/>
+          </p:cNvSpPr>
+          <p:nvPr>
+            <p:ph type="title"/>
+          </p:nvPr>
+        </p:nvSpPr>
+        <p:spPr/>
+        <p:txBody>
+          <a:bodyPr/>
+          <a:lstStyle/>
+          <a:p>
+            <a:r>
+              <a:rPr lang="en-US" dirty="0" smtClean="0"/>
+              <a:t>Selected Example</a:t>
+            </a:r>
+            <a:endParaRPr lang="en-US" dirty="0"/>
+          </a:p>
+        </p:txBody>
+      </p:sp>
+      <p:pic>
+        <p:nvPicPr>
+          <p:cNvPr id="3077" name="Picture 5"/>
+          <p:cNvPicPr>
+            <a:picLocks noChangeAspect="1" noChangeArrowheads="1"/>
+          </p:cNvPicPr>
+          <p:nvPr/>
+        </p:nvPicPr>
+        <p:blipFill>
+          <a:blip r:embed="rId3" cstate="print"/>
+          <a:srcRect/>
+          <a:stretch>
+            <a:fillRect/>
+          </a:stretch>
+        </p:blipFill>
+        <p:spPr bwMode="auto">
+          <a:xfrm>
+            <a:off x="4419600" y="1219200"/>
+            <a:ext cx="4324350" cy="5033944"/>
+          </a:xfrm>
+          <a:prstGeom prst="rect">
+            <a:avLst/>
+          </a:prstGeom>
+          <a:noFill/>
+          <a:ln w="9525">
+            <a:noFill/>
+            <a:miter lim="800000"/>
+            <a:headEnd/>
+            <a:tailEnd/>
+          </a:ln>
+        </p:spPr>
+      </p:pic>
+      <p:pic>
+        <p:nvPicPr>
+          <p:cNvPr id="3080" name="Picture 8"/>
+          <p:cNvPicPr>
+            <a:picLocks noChangeAspect="1" noChangeArrowheads="1"/>
+          </p:cNvPicPr>
+          <p:nvPr/>
+        </p:nvPicPr>
+        <p:blipFill>
+          <a:blip r:embed="rId4" cstate="print"/>
+          <a:srcRect/>
+          <a:stretch>
+            <a:fillRect/>
+          </a:stretch>
+        </p:blipFill>
+        <p:spPr bwMode="auto">
+          <a:xfrm>
+            <a:off x="228600" y="4953000"/>
+            <a:ext cx="4086225" cy="733425"/>
+          </a:xfrm>
+          <a:prstGeom prst="rect">
+            <a:avLst/>
+          </a:prstGeom>
+          <a:noFill/>
+          <a:ln w="9525">
+            <a:noFill/>
+            <a:miter lim="800000"/>
+            <a:headEnd/>
+            <a:tailEnd/>
+          </a:ln>
+        </p:spPr>
+      </p:pic>
+      <p:sp>
+        <p:nvSpPr>
+          <p:cNvPr id="11" name="TextBox 10"/>
+          <p:cNvSpPr txBox="1"/>
+          <p:nvPr/>
+        </p:nvSpPr>
+        <p:spPr>
+          <a:xfrm>
+            <a:off x="228600" y="1295400"/>
+            <a:ext cx="3511346" cy="369332"/>
+          </a:xfrm>
+          <a:prstGeom prst="rect">
+            <a:avLst/>
+          </a:prstGeom>
+          <a:noFill/>
+        </p:spPr>
+        <p:txBody>
+          <a:bodyPr wrap="none" rtlCol="0">
+            <a:spAutoFit/>
+          </a:bodyPr>
+          <a:lstStyle/>
+          <a:p>
+            <a:r>
+              <a:rPr lang="en-US" dirty="0" smtClean="0"/>
+              <a:t>Getting selected items from a </a:t>
+            </a:r>
+            <a:r>
+              <a:rPr lang="en-US" dirty="0" err="1" smtClean="0"/>
+              <a:t>listbox</a:t>
+            </a:r>
+            <a:endParaRPr lang="en-US" dirty="0"/>
+          </a:p>
+        </p:txBody>
+      </p:sp>
+      <p:sp>
+        <p:nvSpPr>
+          <p:cNvPr id="12" name="Right Arrow 11"/>
+          <p:cNvSpPr/>
+          <p:nvPr/>
+        </p:nvSpPr>
+        <p:spPr>
+          <a:xfrm rot="5400000">
+            <a:off x="685800" y="4038600"/>
+            <a:ext cx="1371600" cy="457200"/>
+          </a:xfrm>
+          <a:prstGeom prst="rightArrow">
+            <a:avLst/>
+          </a:prstGeom>
+        </p:spPr>
+        <p:style>
+          <a:lnRef idx="2">
+            <a:schemeClr val="accent1">
+              <a:shade val="50000"/>
+            </a:schemeClr>
+          </a:lnRef>
+          <a:fillRef idx="1">
+            <a:schemeClr val="accent1"/>
+          </a:fillRef>
+          <a:effectRef idx="0">
+            <a:schemeClr val="accent1"/>
+          </a:effectRef>
+          <a:fontRef idx="minor">
+            <a:schemeClr val="lt1"/>
+          </a:fontRef>
+        </p:style>
+        <p:txBody>
+          <a:bodyPr rtlCol="0" anchor="ctr"/>
+          <a:lstStyle/>
+          <a:p>
+            <a:pPr algn="ctr"/>
+            <a:endParaRPr lang="en-US"/>
+          </a:p>
+        </p:txBody>
+      </p:sp>
+      <p:sp>
+        <p:nvSpPr>
+          <p:cNvPr id="13" name="TextBox 12"/>
+          <p:cNvSpPr txBox="1"/>
+          <p:nvPr/>
+        </p:nvSpPr>
+        <p:spPr>
+          <a:xfrm>
+            <a:off x="1752600" y="3886200"/>
+            <a:ext cx="1754070" cy="369332"/>
+          </a:xfrm>
+          <a:prstGeom prst="rect">
+            <a:avLst/>
+          </a:prstGeom>
+          <a:noFill/>
+        </p:spPr>
+        <p:txBody>
+          <a:bodyPr wrap="none" rtlCol="0">
+            <a:spAutoFit/>
+          </a:bodyPr>
+          <a:lstStyle/>
+          <a:p>
+            <a:r>
+              <a:rPr lang="en-US" dirty="0" smtClean="0"/>
+              <a:t>Now it turns to…</a:t>
+            </a:r>
+            <a:endParaRPr lang="en-US" dirty="0"/>
+          </a:p>
+        </p:txBody>
+      </p:sp>
+      <p:sp>
+        <p:nvSpPr>
+          <p:cNvPr id="14" name="TextBox 13"/>
+          <p:cNvSpPr txBox="1"/>
+          <p:nvPr/>
+        </p:nvSpPr>
+        <p:spPr>
+          <a:xfrm>
+            <a:off x="228600" y="1676400"/>
+            <a:ext cx="3326039" cy="369332"/>
+          </a:xfrm>
+          <a:prstGeom prst="rect">
+            <a:avLst/>
+          </a:prstGeom>
+          <a:noFill/>
+        </p:spPr>
+        <p:txBody>
+          <a:bodyPr wrap="none" rtlCol="0">
+            <a:spAutoFit/>
+          </a:bodyPr>
+          <a:lstStyle/>
+          <a:p>
+            <a:r>
+              <a:rPr lang="en-US" dirty="0" smtClean="0"/>
+              <a:t>This is what we see everywhere…</a:t>
+            </a:r>
+            <a:endParaRPr lang="en-US" dirty="0"/>
+          </a:p>
+        </p:txBody>
+      </p:sp>
+    </p:spTree>
+  </p:cSld>
+  <p:clrMapOvr>
+    <a:masterClrMapping/>
+  </p:clrMapOvr>
+</p:sld>
+</file>
+
+<file path=ppt/slides/slide34.xml><?xml version="1.0" encoding="utf-8"?>
+<p:sld xmlns:a="http://schemas.openxmlformats.org/drawingml/2006/main" xmlns:r="http://schemas.openxmlformats.org/officeDocument/2006/relationships" xmlns:p="http://schemas.openxmlformats.org/presentationml/2006/main">
+  <p:cSld>
+    <p:spTree>
+      <p:nvGrpSpPr>
+        <p:cNvPr id="1" name=""/>
+        <p:cNvGrpSpPr/>
+        <p:nvPr/>
+      </p:nvGrpSpPr>
+      <p:grpSpPr>
+        <a:xfrm>
+          <a:off x="0" y="0"/>
+          <a:ext cx="0" cy="0"/>
+          <a:chOff x="0" y="0"/>
+          <a:chExt cx="0" cy="0"/>
+        </a:xfrm>
+      </p:grpSpPr>
+      <p:sp>
+        <p:nvSpPr>
+          <p:cNvPr id="2" name="Title 1"/>
+          <p:cNvSpPr>
+            <a:spLocks noGrp="1"/>
+          </p:cNvSpPr>
+          <p:nvPr>
+            <p:ph type="title"/>
+          </p:nvPr>
+        </p:nvSpPr>
+        <p:spPr/>
+        <p:txBody>
+          <a:bodyPr/>
+          <a:lstStyle/>
+          <a:p>
+            <a:r>
+              <a:rPr lang="en-US" dirty="0" smtClean="0"/>
+              <a:t>Putting it all together</a:t>
+            </a:r>
+            <a:endParaRPr lang="en-US" dirty="0"/>
+          </a:p>
+        </p:txBody>
+      </p:sp>
+      <p:sp>
+        <p:nvSpPr>
+          <p:cNvPr id="3" name="Text Placeholder 2"/>
+          <p:cNvSpPr>
+            <a:spLocks noGrp="1"/>
+          </p:cNvSpPr>
+          <p:nvPr>
+            <p:ph type="body" idx="1"/>
+          </p:nvPr>
+        </p:nvSpPr>
+        <p:spPr/>
+        <p:txBody>
+          <a:bodyPr/>
+          <a:lstStyle/>
+          <a:p>
+            <a:endParaRPr lang="en-US"/>
+          </a:p>
+        </p:txBody>
+      </p:sp>
+    </p:spTree>
+  </p:cSld>
+  <p:clrMapOvr>
+    <a:masterClrMapping/>
+  </p:clrMapOvr>
+</p:sld>
+</file>
+
+<file path=ppt/slides/slide35.xml><?xml version="1.0" encoding="utf-8"?>
+<p:sld xmlns:a="http://schemas.openxmlformats.org/drawingml/2006/main" xmlns:r="http://schemas.openxmlformats.org/officeDocument/2006/relationships" xmlns:p="http://schemas.openxmlformats.org/presentationml/2006/main">
+  <p:cSld>
+    <p:spTree>
+      <p:nvGrpSpPr>
+        <p:cNvPr id="1" name=""/>
+        <p:cNvGrpSpPr/>
+        <p:nvPr/>
+      </p:nvGrpSpPr>
+      <p:grpSpPr>
+        <a:xfrm>
+          <a:off x="0" y="0"/>
+          <a:ext cx="0" cy="0"/>
+          <a:chOff x="0" y="0"/>
+          <a:chExt cx="0" cy="0"/>
+        </a:xfrm>
+      </p:grpSpPr>
+      <p:sp>
+        <p:nvSpPr>
+          <p:cNvPr id="2" name="Title 1"/>
+          <p:cNvSpPr>
+            <a:spLocks noGrp="1"/>
+          </p:cNvSpPr>
+          <p:nvPr>
+            <p:ph type="title"/>
+          </p:nvPr>
+        </p:nvSpPr>
+        <p:spPr/>
+        <p:txBody>
+          <a:bodyPr/>
+          <a:lstStyle/>
+          <a:p>
+            <a:r>
+              <a:rPr lang="en-US" dirty="0" smtClean="0"/>
+              <a:t>Expression trees advanced</a:t>
+            </a:r>
+            <a:endParaRPr lang="en-US" dirty="0"/>
+          </a:p>
+        </p:txBody>
+      </p:sp>
+      <p:sp>
+        <p:nvSpPr>
+          <p:cNvPr id="3" name="Text Placeholder 2"/>
+          <p:cNvSpPr>
+            <a:spLocks noGrp="1"/>
+          </p:cNvSpPr>
+          <p:nvPr>
+            <p:ph type="body" idx="1"/>
+          </p:nvPr>
+        </p:nvSpPr>
+        <p:spPr/>
+        <p:txBody>
+          <a:bodyPr/>
+          <a:lstStyle/>
+          <a:p>
+            <a:endParaRPr lang="en-US"/>
+          </a:p>
+        </p:txBody>
+      </p:sp>
+    </p:spTree>
+  </p:cSld>
+  <p:clrMapOvr>
+    <a:masterClrMapping/>
+  </p:clrMapOvr>
+</p:sld>
+</file>
+
+<file path=ppt/slides/slide36.xml><?xml version="1.0" encoding="utf-8"?>
+<p:sld xmlns:a="http://schemas.openxmlformats.org/drawingml/2006/main" xmlns:r="http://schemas.openxmlformats.org/officeDocument/2006/relationships" xmlns:p="http://schemas.openxmlformats.org/presentationml/2006/main">
+  <p:cSld>
+    <p:spTree>
+      <p:nvGrpSpPr>
+        <p:cNvPr id="1" name=""/>
+        <p:cNvGrpSpPr/>
+        <p:nvPr/>
+      </p:nvGrpSpPr>
+      <p:grpSpPr>
+        <a:xfrm>
+          <a:off x="0" y="0"/>
+          <a:ext cx="0" cy="0"/>
+          <a:chOff x="0" y="0"/>
+          <a:chExt cx="0" cy="0"/>
+        </a:xfrm>
+      </p:grpSpPr>
+      <p:sp>
+        <p:nvSpPr>
+          <p:cNvPr id="2" name="Title 1"/>
+          <p:cNvSpPr>
+            <a:spLocks noGrp="1"/>
+          </p:cNvSpPr>
+          <p:nvPr>
+            <p:ph type="title"/>
+          </p:nvPr>
+        </p:nvSpPr>
+        <p:spPr/>
+        <p:txBody>
+          <a:bodyPr/>
+          <a:lstStyle/>
+          <a:p>
+            <a:r>
+              <a:rPr lang="en-US" dirty="0" smtClean="0"/>
+              <a:t>Expression Tree </a:t>
+            </a:r>
+            <a:r>
+              <a:rPr lang="en-US" dirty="0" err="1" smtClean="0"/>
+              <a:t>Visualizer</a:t>
+            </a:r>
+            <a:endParaRPr lang="en-US" dirty="0"/>
+          </a:p>
+        </p:txBody>
+      </p:sp>
       <p:sp>
         <p:nvSpPr>
           <p:cNvPr id="3" name="Content Placeholder 2"/>
@@ -5935,82 +6758,419 @@
         </p:nvSpPr>
         <p:spPr/>
         <p:txBody>
-          <a:bodyPr/>
-          <a:lstStyle/>
-          <a:p>
-            <a:pPr fontAlgn="ctr"/>
-            <a:r>
-              <a:rPr lang="en-US" dirty="0"/>
-              <a:t>Fluent Interface</a:t>
-            </a:r>
-            <a:endParaRPr lang="en-US" dirty="0" smtClean="0"/>
-          </a:p>
-          <a:p>
-            <a:pPr lvl="1" fontAlgn="ctr"/>
-            <a:r>
-              <a:rPr lang="en-US" dirty="0"/>
-              <a:t>What are they</a:t>
-            </a:r>
-            <a:endParaRPr lang="en-US" dirty="0" smtClean="0"/>
-          </a:p>
-          <a:p>
-            <a:pPr lvl="1" fontAlgn="ctr"/>
-            <a:r>
-              <a:rPr lang="en-US" dirty="0"/>
-              <a:t>Get Selected Items</a:t>
-            </a:r>
-            <a:endParaRPr lang="en-US" dirty="0" smtClean="0"/>
-          </a:p>
-          <a:p>
-            <a:pPr lvl="1" fontAlgn="ctr"/>
-            <a:r>
-              <a:rPr lang="en-US" dirty="0"/>
-              <a:t>Fluent </a:t>
-            </a:r>
-            <a:r>
-              <a:rPr lang="en-US" dirty="0" err="1"/>
-              <a:t>Nhibernate</a:t>
-            </a:r>
-            <a:r>
-              <a:rPr lang="en-US" dirty="0"/>
-              <a:t> (</a:t>
-            </a:r>
-            <a:r>
-              <a:rPr lang="en-US" dirty="0" err="1"/>
-              <a:t>config</a:t>
-            </a:r>
-            <a:r>
-              <a:rPr lang="en-US" dirty="0"/>
-              <a:t>)</a:t>
-            </a:r>
-            <a:endParaRPr lang="en-US" dirty="0" smtClean="0"/>
-          </a:p>
-          <a:p>
-            <a:pPr lvl="1" fontAlgn="ctr"/>
-            <a:r>
-              <a:rPr lang="en-US" dirty="0"/>
-              <a:t>Open Rasta (</a:t>
-            </a:r>
-            <a:r>
-              <a:rPr lang="en-US" dirty="0" err="1"/>
-              <a:t>config</a:t>
-            </a:r>
-            <a:r>
-              <a:rPr lang="en-US" dirty="0"/>
-              <a:t>)</a:t>
-            </a:r>
-            <a:endParaRPr lang="en-US" dirty="0" smtClean="0"/>
-          </a:p>
-          <a:p>
-            <a:pPr lvl="1" fontAlgn="ctr"/>
-            <a:r>
-              <a:rPr lang="en-US" dirty="0"/>
-              <a:t>Structure Map </a:t>
-            </a:r>
-            <a:endParaRPr lang="en-US" dirty="0" smtClean="0"/>
-          </a:p>
-          <a:p>
+          <a:bodyPr>
+            <a:normAutofit lnSpcReduction="10000"/>
+          </a:bodyPr>
+          <a:lstStyle/>
+          <a:p>
+            <a:r>
+              <a:rPr lang="en-US" sz="2400" i="1" dirty="0" smtClean="0"/>
+              <a:t>In </a:t>
+            </a:r>
+            <a:r>
+              <a:rPr lang="en-US" sz="2400" i="1" dirty="0" smtClean="0"/>
+              <a:t>order to get this </a:t>
+            </a:r>
+            <a:r>
+              <a:rPr lang="en-US" sz="2400" i="1" dirty="0" err="1" smtClean="0"/>
+              <a:t>visualizer</a:t>
+            </a:r>
+            <a:r>
+              <a:rPr lang="en-US" sz="2400" i="1" dirty="0" smtClean="0"/>
+              <a:t> you need to go to the samples folder where you installed VS and open the </a:t>
+            </a:r>
+            <a:r>
+              <a:rPr lang="en-US" sz="2400" i="1" dirty="0" err="1" smtClean="0"/>
+              <a:t>visualizer</a:t>
+            </a:r>
+            <a:r>
+              <a:rPr lang="en-US" sz="2400" i="1" dirty="0" smtClean="0"/>
+              <a:t> project and build it then copy it to the </a:t>
+            </a:r>
+            <a:r>
+              <a:rPr lang="en-US" sz="2400" i="1" dirty="0" err="1" smtClean="0"/>
+              <a:t>visualizer</a:t>
+            </a:r>
+            <a:r>
+              <a:rPr lang="en-US" sz="2400" i="1" dirty="0" smtClean="0"/>
+              <a:t> folder in Documents and Settings for your user</a:t>
+            </a:r>
+            <a:r>
+              <a:rPr lang="en-US" sz="2400" i="1" dirty="0" smtClean="0"/>
+              <a:t>.</a:t>
+            </a:r>
+          </a:p>
+          <a:p>
+            <a:r>
+              <a:rPr lang="en-US" sz="2400" i="1" dirty="0" smtClean="0"/>
+              <a:t>My steps</a:t>
+            </a:r>
+          </a:p>
+          <a:p>
+            <a:pPr marL="914400" lvl="1" indent="-457200">
+              <a:buAutoNum type="arabicPeriod"/>
+            </a:pPr>
+            <a:r>
+              <a:rPr lang="en-US" sz="2000" dirty="0" smtClean="0"/>
+              <a:t>C</a:t>
+            </a:r>
+            <a:r>
+              <a:rPr lang="en-US" sz="2000" dirty="0" smtClean="0"/>
+              <a:t>:\Program Files (x86)\Microsoft Visual Studio </a:t>
+            </a:r>
+            <a:r>
+              <a:rPr lang="en-US" sz="2000" dirty="0" smtClean="0"/>
+              <a:t>9.0\Samples\1033</a:t>
+            </a:r>
+          </a:p>
+          <a:p>
+            <a:pPr marL="914400" lvl="1" indent="-457200">
+              <a:buAutoNum type="arabicPeriod"/>
+            </a:pPr>
+            <a:r>
+              <a:rPr lang="en-US" sz="2000" dirty="0" smtClean="0"/>
+              <a:t>Unzip CSharpSamples.zip (I extracted mine to C:\CSharpSamples)</a:t>
+            </a:r>
+          </a:p>
+          <a:p>
+            <a:pPr marL="914400" lvl="1" indent="-457200">
+              <a:buAutoNum type="arabicPeriod"/>
+            </a:pPr>
+            <a:r>
+              <a:rPr lang="en-US" sz="2000" dirty="0" smtClean="0"/>
+              <a:t>Go to </a:t>
+            </a:r>
+            <a:r>
+              <a:rPr lang="en-US" sz="2000" dirty="0" err="1" smtClean="0"/>
+              <a:t>CSharpSamples</a:t>
+            </a:r>
+            <a:r>
+              <a:rPr lang="en-US" sz="2000" dirty="0" smtClean="0"/>
+              <a:t>\</a:t>
+            </a:r>
+            <a:r>
+              <a:rPr lang="en-US" sz="2000" dirty="0" err="1" smtClean="0"/>
+              <a:t>LinqSamples</a:t>
+            </a:r>
+            <a:r>
+              <a:rPr lang="en-US" sz="2000" dirty="0" smtClean="0"/>
+              <a:t>\</a:t>
+            </a:r>
+            <a:r>
+              <a:rPr lang="en-US" sz="2000" dirty="0" err="1" smtClean="0"/>
+              <a:t>ExpressionTreeVisualizer</a:t>
+            </a:r>
+            <a:endParaRPr lang="en-US" sz="2000" dirty="0" smtClean="0"/>
+          </a:p>
+          <a:p>
+            <a:pPr marL="914400" lvl="1" indent="-457200">
+              <a:buAutoNum type="arabicPeriod"/>
+            </a:pPr>
+            <a:r>
+              <a:rPr lang="en-US" sz="2000" dirty="0" smtClean="0"/>
+              <a:t>Open </a:t>
+            </a:r>
+            <a:r>
+              <a:rPr lang="en-US" sz="2000" dirty="0" err="1" smtClean="0"/>
+              <a:t>ExpressionTreeVisualizer</a:t>
+            </a:r>
+            <a:r>
+              <a:rPr lang="en-US" sz="2000" dirty="0" smtClean="0"/>
+              <a:t> </a:t>
+            </a:r>
+            <a:r>
+              <a:rPr lang="en-US" sz="2000" dirty="0" smtClean="0"/>
+              <a:t>solution</a:t>
+            </a:r>
+          </a:p>
+          <a:p>
+            <a:pPr marL="914400" lvl="1" indent="-457200">
+              <a:buAutoNum type="arabicPeriod"/>
+            </a:pPr>
+            <a:r>
+              <a:rPr lang="en-US" sz="2000" dirty="0" smtClean="0"/>
+              <a:t>Build solution</a:t>
+            </a:r>
+          </a:p>
+          <a:p>
+            <a:pPr marL="914400" lvl="1" indent="-457200">
+              <a:buAutoNum type="arabicPeriod"/>
+            </a:pPr>
+            <a:r>
+              <a:rPr lang="en-US" sz="2000" dirty="0" smtClean="0"/>
+              <a:t>Copy </a:t>
+            </a:r>
+            <a:r>
+              <a:rPr lang="en-US" sz="2000" dirty="0" err="1" smtClean="0"/>
+              <a:t>dll</a:t>
+            </a:r>
+            <a:r>
+              <a:rPr lang="en-US" sz="2000" dirty="0" smtClean="0"/>
+              <a:t> from bin</a:t>
+            </a:r>
+          </a:p>
+          <a:p>
+            <a:pPr marL="914400" lvl="1" indent="-457200">
+              <a:buAutoNum type="arabicPeriod"/>
+            </a:pPr>
+            <a:r>
+              <a:rPr lang="en-US" sz="2000" dirty="0" smtClean="0"/>
+              <a:t>Paste @</a:t>
+            </a:r>
+            <a:r>
+              <a:rPr lang="en-US" sz="2000" dirty="0" smtClean="0"/>
+              <a:t> C</a:t>
+            </a:r>
+            <a:r>
+              <a:rPr lang="en-US" sz="2000" dirty="0" smtClean="0"/>
+              <a:t>:\Users\Jonathan </a:t>
+            </a:r>
+            <a:r>
+              <a:rPr lang="en-US" sz="2000" dirty="0" err="1" smtClean="0"/>
+              <a:t>Birkholz</a:t>
+            </a:r>
+            <a:r>
+              <a:rPr lang="en-US" sz="2000" dirty="0" smtClean="0"/>
+              <a:t>\Documents\Visual Studio 2008\</a:t>
+            </a:r>
+            <a:r>
+              <a:rPr lang="en-US" sz="2000" dirty="0" err="1" smtClean="0"/>
+              <a:t>Visualizers</a:t>
+            </a:r>
+            <a:endParaRPr lang="en-US" sz="2000" dirty="0" smtClean="0"/>
+          </a:p>
+          <a:p>
+            <a:pPr marL="914400" lvl="1" indent="-457200">
+              <a:buAutoNum type="arabicPeriod"/>
+            </a:pPr>
+            <a:endParaRPr lang="en-US" sz="2000" dirty="0"/>
+          </a:p>
+        </p:txBody>
+      </p:sp>
+    </p:spTree>
+  </p:cSld>
+  <p:clrMapOvr>
+    <a:masterClrMapping/>
+  </p:clrMapOvr>
+</p:sld>
+</file>
+
+<file path=ppt/slides/slide37.xml><?xml version="1.0" encoding="utf-8"?>
+<p:sld xmlns:a="http://schemas.openxmlformats.org/drawingml/2006/main" xmlns:r="http://schemas.openxmlformats.org/officeDocument/2006/relationships" xmlns:p="http://schemas.openxmlformats.org/presentationml/2006/main">
+  <p:cSld>
+    <p:spTree>
+      <p:nvGrpSpPr>
+        <p:cNvPr id="1" name=""/>
+        <p:cNvGrpSpPr/>
+        <p:nvPr/>
+      </p:nvGrpSpPr>
+      <p:grpSpPr>
+        <a:xfrm>
+          <a:off x="0" y="0"/>
+          <a:ext cx="0" cy="0"/>
+          <a:chOff x="0" y="0"/>
+          <a:chExt cx="0" cy="0"/>
+        </a:xfrm>
+      </p:grpSpPr>
+      <p:sp>
+        <p:nvSpPr>
+          <p:cNvPr id="2" name="Title 1"/>
+          <p:cNvSpPr>
+            <a:spLocks noGrp="1"/>
+          </p:cNvSpPr>
+          <p:nvPr>
+            <p:ph type="title"/>
+          </p:nvPr>
+        </p:nvSpPr>
+        <p:spPr/>
+        <p:txBody>
+          <a:bodyPr/>
+          <a:lstStyle/>
+          <a:p>
+            <a:r>
+              <a:rPr lang="en-US" dirty="0" smtClean="0"/>
+              <a:t>Brief Reminder</a:t>
+            </a:r>
             <a:endParaRPr lang="en-US" dirty="0"/>
+          </a:p>
+        </p:txBody>
+      </p:sp>
+      <p:pic>
+        <p:nvPicPr>
+          <p:cNvPr id="1026" name="Picture 2"/>
+          <p:cNvPicPr>
+            <a:picLocks noChangeAspect="1" noChangeArrowheads="1"/>
+          </p:cNvPicPr>
+          <p:nvPr/>
+        </p:nvPicPr>
+        <p:blipFill>
+          <a:blip r:embed="rId2" cstate="print"/>
+          <a:srcRect/>
+          <a:stretch>
+            <a:fillRect/>
+          </a:stretch>
+        </p:blipFill>
+        <p:spPr bwMode="auto">
+          <a:xfrm>
+            <a:off x="1828800" y="1295400"/>
+            <a:ext cx="5295900" cy="4854575"/>
+          </a:xfrm>
+          <a:prstGeom prst="rect">
+            <a:avLst/>
+          </a:prstGeom>
+          <a:noFill/>
+          <a:ln w="9525">
+            <a:noFill/>
+            <a:miter lim="800000"/>
+            <a:headEnd/>
+            <a:tailEnd/>
+          </a:ln>
+          <a:effectLst/>
+        </p:spPr>
+      </p:pic>
+    </p:spTree>
+  </p:cSld>
+  <p:clrMapOvr>
+    <a:masterClrMapping/>
+  </p:clrMapOvr>
+</p:sld>
+</file>
+
+<file path=ppt/slides/slide38.xml><?xml version="1.0" encoding="utf-8"?>
+<p:sld xmlns:a="http://schemas.openxmlformats.org/drawingml/2006/main" xmlns:r="http://schemas.openxmlformats.org/officeDocument/2006/relationships" xmlns:p="http://schemas.openxmlformats.org/presentationml/2006/main">
+  <p:cSld>
+    <p:spTree>
+      <p:nvGrpSpPr>
+        <p:cNvPr id="1" name=""/>
+        <p:cNvGrpSpPr/>
+        <p:nvPr/>
+      </p:nvGrpSpPr>
+      <p:grpSpPr>
+        <a:xfrm>
+          <a:off x="0" y="0"/>
+          <a:ext cx="0" cy="0"/>
+          <a:chOff x="0" y="0"/>
+          <a:chExt cx="0" cy="0"/>
+        </a:xfrm>
+      </p:grpSpPr>
+      <p:sp>
+        <p:nvSpPr>
+          <p:cNvPr id="2" name="Title 1"/>
+          <p:cNvSpPr>
+            <a:spLocks noGrp="1"/>
+          </p:cNvSpPr>
+          <p:nvPr>
+            <p:ph type="title"/>
+          </p:nvPr>
+        </p:nvSpPr>
+        <p:spPr/>
+        <p:txBody>
+          <a:bodyPr/>
+          <a:lstStyle/>
+          <a:p>
+            <a:r>
+              <a:rPr lang="en-US" dirty="0" smtClean="0"/>
+              <a:t>Using the Visitor Pattern</a:t>
+            </a:r>
+            <a:endParaRPr lang="en-US" dirty="0"/>
+          </a:p>
+        </p:txBody>
+      </p:sp>
+      <p:sp>
+        <p:nvSpPr>
+          <p:cNvPr id="3" name="Content Placeholder 2"/>
+          <p:cNvSpPr>
+            <a:spLocks noGrp="1"/>
+          </p:cNvSpPr>
+          <p:nvPr>
+            <p:ph idx="1"/>
+          </p:nvPr>
+        </p:nvSpPr>
+        <p:spPr/>
+        <p:txBody>
+          <a:bodyPr/>
+          <a:lstStyle/>
+          <a:p>
+            <a:r>
+              <a:rPr lang="en-US" dirty="0" smtClean="0"/>
+              <a:t>MSDN : http://msdn.microsoft.com/en-us/library/bb882521.aspx</a:t>
+            </a:r>
+            <a:endParaRPr lang="en-US" dirty="0"/>
+          </a:p>
+        </p:txBody>
+      </p:sp>
+    </p:spTree>
+  </p:cSld>
+  <p:clrMapOvr>
+    <a:masterClrMapping/>
+  </p:clrMapOvr>
+</p:sld>
+</file>
+
+<file path=ppt/slides/slide39.xml><?xml version="1.0" encoding="utf-8"?>
+<p:sld xmlns:a="http://schemas.openxmlformats.org/drawingml/2006/main" xmlns:r="http://schemas.openxmlformats.org/officeDocument/2006/relationships" xmlns:p="http://schemas.openxmlformats.org/presentationml/2006/main">
+  <p:cSld>
+    <p:spTree>
+      <p:nvGrpSpPr>
+        <p:cNvPr id="1" name=""/>
+        <p:cNvGrpSpPr/>
+        <p:nvPr/>
+      </p:nvGrpSpPr>
+      <p:grpSpPr>
+        <a:xfrm>
+          <a:off x="0" y="0"/>
+          <a:ext cx="0" cy="0"/>
+          <a:chOff x="0" y="0"/>
+          <a:chExt cx="0" cy="0"/>
+        </a:xfrm>
+      </p:grpSpPr>
+      <p:sp>
+        <p:nvSpPr>
+          <p:cNvPr id="2" name="Title 1"/>
+          <p:cNvSpPr>
+            <a:spLocks noGrp="1"/>
+          </p:cNvSpPr>
+          <p:nvPr>
+            <p:ph type="title"/>
+          </p:nvPr>
+        </p:nvSpPr>
+        <p:spPr/>
+        <p:txBody>
+          <a:bodyPr/>
+          <a:lstStyle/>
+          <a:p>
+            <a:r>
+              <a:rPr lang="en-US" dirty="0" err="1" smtClean="0"/>
+              <a:t>Poco</a:t>
+            </a:r>
+            <a:r>
+              <a:rPr lang="en-US" dirty="0" smtClean="0"/>
+              <a:t> Entity Framework </a:t>
+            </a:r>
+            <a:r>
+              <a:rPr lang="en-US" dirty="0" err="1" smtClean="0"/>
+              <a:t>poc</a:t>
+            </a:r>
+            <a:endParaRPr lang="en-US" dirty="0"/>
+          </a:p>
+        </p:txBody>
+      </p:sp>
+      <p:sp>
+        <p:nvSpPr>
+          <p:cNvPr id="3" name="Text Placeholder 2"/>
+          <p:cNvSpPr>
+            <a:spLocks noGrp="1"/>
+          </p:cNvSpPr>
+          <p:nvPr>
+            <p:ph type="body" idx="1"/>
+          </p:nvPr>
+        </p:nvSpPr>
+        <p:spPr/>
+        <p:txBody>
+          <a:bodyPr/>
+          <a:lstStyle/>
+          <a:p>
+            <a:endParaRPr lang="en-US"/>
           </a:p>
         </p:txBody>
       </p:sp>
@@ -6055,15 +7215,383 @@
           <a:lstStyle/>
           <a:p>
             <a:r>
-              <a:rPr lang="en-US" dirty="0" smtClean="0"/>
+              <a:rPr lang="en-US" dirty="0" smtClean="0">
+                <a:latin typeface="FuturaTCEMed" pitchFamily="2" charset="0"/>
+              </a:rPr>
               <a:t>Extension methods</a:t>
             </a:r>
+            <a:endParaRPr lang="en-US" dirty="0">
+              <a:latin typeface="FuturaTCEMed" pitchFamily="2" charset="0"/>
+            </a:endParaRPr>
+          </a:p>
+        </p:txBody>
+      </p:sp>
+      <p:sp>
+        <p:nvSpPr>
+          <p:cNvPr id="3" name="Text Placeholder 2"/>
+          <p:cNvSpPr>
+            <a:spLocks noGrp="1"/>
+          </p:cNvSpPr>
+          <p:nvPr>
+            <p:ph type="body" idx="1"/>
+          </p:nvPr>
+        </p:nvSpPr>
+        <p:spPr/>
+        <p:txBody>
+          <a:bodyPr/>
+          <a:lstStyle/>
+          <a:p>
+            <a:endParaRPr lang="en-US"/>
+          </a:p>
+        </p:txBody>
+      </p:sp>
+    </p:spTree>
+  </p:cSld>
+  <p:clrMapOvr>
+    <a:masterClrMapping/>
+  </p:clrMapOvr>
+  <p:timing>
+    <p:tnLst>
+      <p:par>
+        <p:cTn id="1" dur="indefinite" restart="never" nodeType="tmRoot"/>
+      </p:par>
+    </p:tnLst>
+  </p:timing>
+</p:sld>
+</file>
+
+<file path=ppt/slides/slide40.xml><?xml version="1.0" encoding="utf-8"?>
+<p:sld xmlns:a="http://schemas.openxmlformats.org/drawingml/2006/main" xmlns:r="http://schemas.openxmlformats.org/officeDocument/2006/relationships" xmlns:p="http://schemas.openxmlformats.org/presentationml/2006/main">
+  <p:cSld>
+    <p:spTree>
+      <p:nvGrpSpPr>
+        <p:cNvPr id="1" name=""/>
+        <p:cNvGrpSpPr/>
+        <p:nvPr/>
+      </p:nvGrpSpPr>
+      <p:grpSpPr>
+        <a:xfrm>
+          <a:off x="0" y="0"/>
+          <a:ext cx="0" cy="0"/>
+          <a:chOff x="0" y="0"/>
+          <a:chExt cx="0" cy="0"/>
+        </a:xfrm>
+      </p:grpSpPr>
+      <p:sp>
+        <p:nvSpPr>
+          <p:cNvPr id="2" name="Title 1"/>
+          <p:cNvSpPr>
+            <a:spLocks noGrp="1"/>
+          </p:cNvSpPr>
+          <p:nvPr>
+            <p:ph type="title"/>
+          </p:nvPr>
+        </p:nvSpPr>
+        <p:spPr/>
+        <p:txBody>
+          <a:bodyPr/>
+          <a:lstStyle/>
+          <a:p>
+            <a:r>
+              <a:rPr lang="en-US" dirty="0" smtClean="0"/>
+              <a:t>Third Party Frameworks</a:t>
+            </a:r>
             <a:endParaRPr lang="en-US" dirty="0"/>
           </a:p>
         </p:txBody>
       </p:sp>
       <p:sp>
         <p:nvSpPr>
+          <p:cNvPr id="3" name="Content Placeholder 2"/>
+          <p:cNvSpPr>
+            <a:spLocks noGrp="1"/>
+          </p:cNvSpPr>
+          <p:nvPr>
+            <p:ph idx="1"/>
+          </p:nvPr>
+        </p:nvSpPr>
+        <p:spPr/>
+        <p:txBody>
+          <a:bodyPr/>
+          <a:lstStyle/>
+          <a:p>
+            <a:r>
+              <a:rPr lang="en-US" dirty="0" smtClean="0"/>
+              <a:t>Fluent </a:t>
+            </a:r>
+            <a:r>
+              <a:rPr lang="en-US" dirty="0" err="1" smtClean="0"/>
+              <a:t>Nhibernate</a:t>
+            </a:r>
+            <a:endParaRPr lang="en-US" dirty="0" smtClean="0"/>
+          </a:p>
+          <a:p>
+            <a:pPr lvl="1"/>
+            <a:r>
+              <a:rPr lang="en-US" dirty="0" smtClean="0"/>
+              <a:t>http://fluentnhibernate.org/</a:t>
+            </a:r>
+          </a:p>
+          <a:p>
+            <a:r>
+              <a:rPr lang="en-US" dirty="0" err="1" smtClean="0"/>
+              <a:t>NBuilder</a:t>
+            </a:r>
+            <a:endParaRPr lang="en-US" dirty="0" smtClean="0"/>
+          </a:p>
+          <a:p>
+            <a:pPr lvl="1"/>
+            <a:r>
+              <a:rPr lang="en-US" dirty="0" smtClean="0"/>
+              <a:t>http</a:t>
+            </a:r>
+            <a:r>
+              <a:rPr lang="en-US" dirty="0" smtClean="0"/>
+              <a:t>://nbuilder.org/</a:t>
+            </a:r>
+            <a:endParaRPr lang="en-US" dirty="0"/>
+          </a:p>
+        </p:txBody>
+      </p:sp>
+    </p:spTree>
+  </p:cSld>
+  <p:clrMapOvr>
+    <a:masterClrMapping/>
+  </p:clrMapOvr>
+</p:sld>
+</file>
+
+<file path=ppt/slides/slide41.xml><?xml version="1.0" encoding="utf-8"?>
+<p:sld xmlns:a="http://schemas.openxmlformats.org/drawingml/2006/main" xmlns:r="http://schemas.openxmlformats.org/officeDocument/2006/relationships" xmlns:p="http://schemas.openxmlformats.org/presentationml/2006/main">
+  <p:cSld>
+    <p:spTree>
+      <p:nvGrpSpPr>
+        <p:cNvPr id="1" name=""/>
+        <p:cNvGrpSpPr/>
+        <p:nvPr/>
+      </p:nvGrpSpPr>
+      <p:grpSpPr>
+        <a:xfrm>
+          <a:off x="0" y="0"/>
+          <a:ext cx="0" cy="0"/>
+          <a:chOff x="0" y="0"/>
+          <a:chExt cx="0" cy="0"/>
+        </a:xfrm>
+      </p:grpSpPr>
+      <p:sp>
+        <p:nvSpPr>
+          <p:cNvPr id="2" name="Title 1"/>
+          <p:cNvSpPr>
+            <a:spLocks noGrp="1"/>
+          </p:cNvSpPr>
+          <p:nvPr>
+            <p:ph type="title"/>
+          </p:nvPr>
+        </p:nvSpPr>
+        <p:spPr/>
+        <p:txBody>
+          <a:bodyPr/>
+          <a:lstStyle/>
+          <a:p>
+            <a:r>
+              <a:rPr lang="en-US" dirty="0" smtClean="0"/>
+              <a:t>Resources</a:t>
+            </a:r>
+            <a:endParaRPr lang="en-US" dirty="0"/>
+          </a:p>
+        </p:txBody>
+      </p:sp>
+      <p:sp>
+        <p:nvSpPr>
+          <p:cNvPr id="3" name="Content Placeholder 2"/>
+          <p:cNvSpPr>
+            <a:spLocks noGrp="1"/>
+          </p:cNvSpPr>
+          <p:nvPr>
+            <p:ph idx="1"/>
+          </p:nvPr>
+        </p:nvSpPr>
+        <p:spPr/>
+        <p:txBody>
+          <a:bodyPr/>
+          <a:lstStyle/>
+          <a:p>
+            <a:r>
+              <a:rPr lang="en-US" dirty="0" smtClean="0"/>
+              <a:t>MSDN (too many links to list)</a:t>
+            </a:r>
+          </a:p>
+          <a:p>
+            <a:r>
+              <a:rPr lang="en-US" dirty="0" smtClean="0"/>
+              <a:t>J.P. Hamilton</a:t>
+            </a:r>
+          </a:p>
+          <a:p>
+            <a:pPr lvl="1"/>
+            <a:r>
+              <a:rPr lang="en-US" dirty="0" smtClean="0">
+                <a:hlinkClick r:id="rId2"/>
+              </a:rPr>
+              <a:t>http://www.jphamilton.net/post/MVVM-with-Type-Safe-INotifyPropertyChanged.aspx</a:t>
+            </a:r>
+            <a:endParaRPr lang="en-US" dirty="0" smtClean="0"/>
+          </a:p>
+          <a:p>
+            <a:r>
+              <a:rPr lang="en-US" dirty="0" smtClean="0"/>
+              <a:t>Wikipedia</a:t>
+            </a:r>
+          </a:p>
+          <a:p>
+            <a:r>
+              <a:rPr lang="en-US" dirty="0" smtClean="0"/>
+              <a:t>Rob </a:t>
+            </a:r>
+            <a:r>
+              <a:rPr lang="en-US" dirty="0" err="1" smtClean="0"/>
+              <a:t>Conery</a:t>
+            </a:r>
+            <a:endParaRPr lang="en-US" dirty="0" smtClean="0"/>
+          </a:p>
+          <a:p>
+            <a:pPr lvl="1"/>
+            <a:r>
+              <a:rPr lang="en-US" dirty="0" smtClean="0"/>
+              <a:t>http://blog.wekeroad.com/blog/working-with-linq-s-expression-trees-visually/</a:t>
+            </a:r>
+            <a:endParaRPr lang="en-US" dirty="0"/>
+          </a:p>
+        </p:txBody>
+      </p:sp>
+    </p:spTree>
+  </p:cSld>
+  <p:clrMapOvr>
+    <a:masterClrMapping/>
+  </p:clrMapOvr>
+</p:sld>
+</file>
+
+<file path=ppt/slides/slide42.xml><?xml version="1.0" encoding="utf-8"?>
+<p:sld xmlns:a="http://schemas.openxmlformats.org/drawingml/2006/main" xmlns:r="http://schemas.openxmlformats.org/officeDocument/2006/relationships" xmlns:p="http://schemas.openxmlformats.org/presentationml/2006/main">
+  <p:cSld>
+    <p:spTree>
+      <p:nvGrpSpPr>
+        <p:cNvPr id="1" name=""/>
+        <p:cNvGrpSpPr/>
+        <p:nvPr/>
+      </p:nvGrpSpPr>
+      <p:grpSpPr>
+        <a:xfrm>
+          <a:off x="0" y="0"/>
+          <a:ext cx="0" cy="0"/>
+          <a:chOff x="0" y="0"/>
+          <a:chExt cx="0" cy="0"/>
+        </a:xfrm>
+      </p:grpSpPr>
+      <p:sp>
+        <p:nvSpPr>
+          <p:cNvPr id="2" name="Title 1"/>
+          <p:cNvSpPr>
+            <a:spLocks noGrp="1"/>
+          </p:cNvSpPr>
+          <p:nvPr>
+            <p:ph type="title"/>
+          </p:nvPr>
+        </p:nvSpPr>
+        <p:spPr/>
+        <p:txBody>
+          <a:bodyPr/>
+          <a:lstStyle/>
+          <a:p>
+            <a:r>
+              <a:rPr lang="en-US" dirty="0" smtClean="0"/>
+              <a:t>Resources II</a:t>
+            </a:r>
+            <a:endParaRPr lang="en-US" dirty="0"/>
+          </a:p>
+        </p:txBody>
+      </p:sp>
+      <p:sp>
+        <p:nvSpPr>
+          <p:cNvPr id="3" name="Content Placeholder 2"/>
+          <p:cNvSpPr>
+            <a:spLocks noGrp="1"/>
+          </p:cNvSpPr>
+          <p:nvPr>
+            <p:ph idx="1"/>
+          </p:nvPr>
+        </p:nvSpPr>
+        <p:spPr/>
+        <p:txBody>
+          <a:bodyPr/>
+          <a:lstStyle/>
+          <a:p>
+            <a:r>
+              <a:rPr lang="en-US" dirty="0" smtClean="0"/>
+              <a:t>Barnett</a:t>
+            </a:r>
+          </a:p>
+          <a:p>
+            <a:pPr lvl="1"/>
+            <a:r>
+              <a:rPr lang="en-US" dirty="0" smtClean="0"/>
+              <a:t>http://weblogs.asp.net/gbarnett/archive/2007/09/15/expression-tree-visualizer.aspx</a:t>
+            </a:r>
+            <a:endParaRPr lang="en-US" dirty="0"/>
+          </a:p>
+        </p:txBody>
+      </p:sp>
+    </p:spTree>
+  </p:cSld>
+  <p:clrMapOvr>
+    <a:masterClrMapping/>
+  </p:clrMapOvr>
+</p:sld>
+</file>
+
+<file path=ppt/slides/slide43.xml><?xml version="1.0" encoding="utf-8"?>
+<p:sld xmlns:a="http://schemas.openxmlformats.org/drawingml/2006/main" xmlns:r="http://schemas.openxmlformats.org/officeDocument/2006/relationships" xmlns:p="http://schemas.openxmlformats.org/presentationml/2006/main">
+  <p:cSld>
+    <p:spTree>
+      <p:nvGrpSpPr>
+        <p:cNvPr id="1" name=""/>
+        <p:cNvGrpSpPr/>
+        <p:nvPr/>
+      </p:nvGrpSpPr>
+      <p:grpSpPr>
+        <a:xfrm>
+          <a:off x="0" y="0"/>
+          <a:ext cx="0" cy="0"/>
+          <a:chOff x="0" y="0"/>
+          <a:chExt cx="0" cy="0"/>
+        </a:xfrm>
+      </p:grpSpPr>
+      <p:sp>
+        <p:nvSpPr>
+          <p:cNvPr id="2" name="Title 1"/>
+          <p:cNvSpPr>
+            <a:spLocks noGrp="1"/>
+          </p:cNvSpPr>
+          <p:nvPr>
+            <p:ph type="title"/>
+          </p:nvPr>
+        </p:nvSpPr>
+        <p:spPr/>
+        <p:txBody>
+          <a:bodyPr/>
+          <a:lstStyle/>
+          <a:p>
+            <a:r>
+              <a:rPr lang="en-US" dirty="0" smtClean="0"/>
+              <a:t>MISC SLIDES</a:t>
+            </a:r>
+            <a:endParaRPr lang="en-US" dirty="0"/>
+          </a:p>
+        </p:txBody>
+      </p:sp>
+      <p:sp>
+        <p:nvSpPr>
           <p:cNvPr id="3" name="Text Placeholder 2"/>
           <p:cNvSpPr>
             <a:spLocks noGrp="1"/>
@@ -6078,6 +7606,268 @@
           <a:lstStyle/>
           <a:p>
             <a:endParaRPr lang="en-US"/>
+          </a:p>
+        </p:txBody>
+      </p:sp>
+    </p:spTree>
+  </p:cSld>
+  <p:clrMapOvr>
+    <a:masterClrMapping/>
+  </p:clrMapOvr>
+</p:sld>
+</file>
+
+<file path=ppt/slides/slide44.xml><?xml version="1.0" encoding="utf-8"?>
+<p:sld xmlns:a="http://schemas.openxmlformats.org/drawingml/2006/main" xmlns:r="http://schemas.openxmlformats.org/officeDocument/2006/relationships" xmlns:p="http://schemas.openxmlformats.org/presentationml/2006/main">
+  <p:cSld>
+    <p:spTree>
+      <p:nvGrpSpPr>
+        <p:cNvPr id="1" name=""/>
+        <p:cNvGrpSpPr/>
+        <p:nvPr/>
+      </p:nvGrpSpPr>
+      <p:grpSpPr>
+        <a:xfrm>
+          <a:off x="0" y="0"/>
+          <a:ext cx="0" cy="0"/>
+          <a:chOff x="0" y="0"/>
+          <a:chExt cx="0" cy="0"/>
+        </a:xfrm>
+      </p:grpSpPr>
+      <p:sp>
+        <p:nvSpPr>
+          <p:cNvPr id="2" name="Title 1"/>
+          <p:cNvSpPr>
+            <a:spLocks noGrp="1"/>
+          </p:cNvSpPr>
+          <p:nvPr>
+            <p:ph type="title"/>
+          </p:nvPr>
+        </p:nvSpPr>
+        <p:spPr/>
+        <p:txBody>
+          <a:bodyPr/>
+          <a:lstStyle/>
+          <a:p>
+            <a:r>
+              <a:rPr lang="en-US" dirty="0" smtClean="0"/>
+              <a:t>Lambda Outline</a:t>
+            </a:r>
+            <a:endParaRPr lang="en-US" dirty="0"/>
+          </a:p>
+        </p:txBody>
+      </p:sp>
+      <p:sp>
+        <p:nvSpPr>
+          <p:cNvPr id="3" name="Content Placeholder 2"/>
+          <p:cNvSpPr>
+            <a:spLocks noGrp="1"/>
+          </p:cNvSpPr>
+          <p:nvPr>
+            <p:ph idx="1"/>
+          </p:nvPr>
+        </p:nvSpPr>
+        <p:spPr/>
+        <p:txBody>
+          <a:bodyPr/>
+          <a:lstStyle/>
+          <a:p>
+            <a:pPr fontAlgn="ctr"/>
+            <a:r>
+              <a:rPr lang="en-US" dirty="0"/>
+              <a:t>Lambda Expressions</a:t>
+            </a:r>
+            <a:endParaRPr lang="en-US" dirty="0" smtClean="0"/>
+          </a:p>
+          <a:p>
+            <a:pPr lvl="1" fontAlgn="ctr"/>
+            <a:r>
+              <a:rPr lang="en-US" dirty="0"/>
+              <a:t>What are they</a:t>
+            </a:r>
+            <a:endParaRPr lang="en-US" dirty="0" smtClean="0"/>
+          </a:p>
+          <a:p>
+            <a:pPr lvl="1" fontAlgn="ctr"/>
+            <a:r>
+              <a:rPr lang="en-US" dirty="0" err="1"/>
+              <a:t>Linq</a:t>
+            </a:r>
+            <a:endParaRPr lang="en-US" dirty="0" smtClean="0"/>
+          </a:p>
+          <a:p>
+            <a:pPr lvl="1" fontAlgn="ctr"/>
+            <a:r>
+              <a:rPr lang="en-US" dirty="0"/>
+              <a:t>WPF Notify Property Change example</a:t>
+            </a:r>
+            <a:endParaRPr lang="en-US" dirty="0" smtClean="0"/>
+          </a:p>
+          <a:p>
+            <a:pPr lvl="1" fontAlgn="ctr"/>
+            <a:r>
+              <a:rPr lang="en-US" dirty="0"/>
+              <a:t>Delegate Commands</a:t>
+            </a:r>
+            <a:endParaRPr lang="en-US" dirty="0" smtClean="0"/>
+          </a:p>
+          <a:p>
+            <a:pPr lvl="1" fontAlgn="ctr"/>
+            <a:r>
+              <a:rPr lang="en-US" dirty="0"/>
+              <a:t>Event Handlers</a:t>
+            </a:r>
+            <a:endParaRPr lang="en-US" dirty="0" smtClean="0"/>
+          </a:p>
+          <a:p>
+            <a:pPr lvl="1" fontAlgn="ctr"/>
+            <a:r>
+              <a:rPr lang="en-US" dirty="0"/>
+              <a:t>EF Example</a:t>
+            </a:r>
+            <a:endParaRPr lang="en-US" dirty="0" smtClean="0"/>
+          </a:p>
+          <a:p>
+            <a:endParaRPr lang="en-US" dirty="0"/>
+          </a:p>
+        </p:txBody>
+      </p:sp>
+    </p:spTree>
+  </p:cSld>
+  <p:clrMapOvr>
+    <a:masterClrMapping/>
+  </p:clrMapOvr>
+</p:sld>
+</file>
+
+<file path=ppt/slides/slide45.xml><?xml version="1.0" encoding="utf-8"?>
+<p:sld xmlns:a="http://schemas.openxmlformats.org/drawingml/2006/main" xmlns:r="http://schemas.openxmlformats.org/officeDocument/2006/relationships" xmlns:p="http://schemas.openxmlformats.org/presentationml/2006/main">
+  <p:cSld>
+    <p:spTree>
+      <p:nvGrpSpPr>
+        <p:cNvPr id="1" name=""/>
+        <p:cNvGrpSpPr/>
+        <p:nvPr/>
+      </p:nvGrpSpPr>
+      <p:grpSpPr>
+        <a:xfrm>
+          <a:off x="0" y="0"/>
+          <a:ext cx="0" cy="0"/>
+          <a:chOff x="0" y="0"/>
+          <a:chExt cx="0" cy="0"/>
+        </a:xfrm>
+      </p:grpSpPr>
+      <p:sp>
+        <p:nvSpPr>
+          <p:cNvPr id="2" name="Title 1"/>
+          <p:cNvSpPr>
+            <a:spLocks noGrp="1"/>
+          </p:cNvSpPr>
+          <p:nvPr>
+            <p:ph type="title"/>
+          </p:nvPr>
+        </p:nvSpPr>
+        <p:spPr/>
+        <p:txBody>
+          <a:bodyPr/>
+          <a:lstStyle/>
+          <a:p>
+            <a:r>
+              <a:rPr lang="en-US" dirty="0" smtClean="0"/>
+              <a:t>Fluent Interface</a:t>
+            </a:r>
+            <a:endParaRPr lang="en-US" dirty="0"/>
+          </a:p>
+        </p:txBody>
+      </p:sp>
+      <p:sp>
+        <p:nvSpPr>
+          <p:cNvPr id="3" name="Content Placeholder 2"/>
+          <p:cNvSpPr>
+            <a:spLocks noGrp="1"/>
+          </p:cNvSpPr>
+          <p:nvPr>
+            <p:ph idx="1"/>
+          </p:nvPr>
+        </p:nvSpPr>
+        <p:spPr/>
+        <p:txBody>
+          <a:bodyPr/>
+          <a:lstStyle/>
+          <a:p>
+            <a:pPr fontAlgn="ctr"/>
+            <a:r>
+              <a:rPr lang="en-US" dirty="0"/>
+              <a:t>Fluent Interface</a:t>
+            </a:r>
+            <a:endParaRPr lang="en-US" dirty="0" smtClean="0"/>
+          </a:p>
+          <a:p>
+            <a:pPr lvl="1" fontAlgn="ctr"/>
+            <a:r>
+              <a:rPr lang="en-US" dirty="0"/>
+              <a:t>What are they</a:t>
+            </a:r>
+            <a:endParaRPr lang="en-US" dirty="0" smtClean="0"/>
+          </a:p>
+          <a:p>
+            <a:pPr lvl="1" fontAlgn="ctr"/>
+            <a:r>
+              <a:rPr lang="en-US" dirty="0"/>
+              <a:t>Get Selected Items</a:t>
+            </a:r>
+            <a:endParaRPr lang="en-US" dirty="0" smtClean="0"/>
+          </a:p>
+          <a:p>
+            <a:pPr lvl="1" fontAlgn="ctr"/>
+            <a:r>
+              <a:rPr lang="en-US" dirty="0"/>
+              <a:t>Fluent </a:t>
+            </a:r>
+            <a:r>
+              <a:rPr lang="en-US" dirty="0" err="1"/>
+              <a:t>Nhibernate</a:t>
+            </a:r>
+            <a:r>
+              <a:rPr lang="en-US" dirty="0"/>
+              <a:t> (</a:t>
+            </a:r>
+            <a:r>
+              <a:rPr lang="en-US" dirty="0" err="1"/>
+              <a:t>config</a:t>
+            </a:r>
+            <a:r>
+              <a:rPr lang="en-US" dirty="0"/>
+              <a:t>)</a:t>
+            </a:r>
+            <a:endParaRPr lang="en-US" dirty="0" smtClean="0"/>
+          </a:p>
+          <a:p>
+            <a:pPr lvl="1" fontAlgn="ctr"/>
+            <a:r>
+              <a:rPr lang="en-US" dirty="0"/>
+              <a:t>Open Rasta (</a:t>
+            </a:r>
+            <a:r>
+              <a:rPr lang="en-US" dirty="0" err="1"/>
+              <a:t>config</a:t>
+            </a:r>
+            <a:r>
+              <a:rPr lang="en-US" dirty="0"/>
+              <a:t>)</a:t>
+            </a:r>
+            <a:endParaRPr lang="en-US" dirty="0" smtClean="0"/>
+          </a:p>
+          <a:p>
+            <a:pPr lvl="1" fontAlgn="ctr"/>
+            <a:r>
+              <a:rPr lang="en-US" dirty="0"/>
+              <a:t>Structure Map </a:t>
+            </a:r>
+            <a:endParaRPr lang="en-US" dirty="0" smtClean="0"/>
+          </a:p>
+          <a:p>
+            <a:endParaRPr lang="en-US" dirty="0"/>
           </a:p>
         </p:txBody>
       </p:sp>
@@ -6122,10 +7912,14 @@
           <a:lstStyle/>
           <a:p>
             <a:r>
-              <a:rPr lang="en-US" dirty="0" smtClean="0"/>
+              <a:rPr lang="en-US" dirty="0" smtClean="0">
+                <a:latin typeface="FuturaTCEMed" pitchFamily="2" charset="0"/>
+              </a:rPr>
               <a:t>What are they?</a:t>
             </a:r>
-            <a:endParaRPr lang="en-US" dirty="0"/>
+            <a:endParaRPr lang="en-US" dirty="0">
+              <a:latin typeface="FuturaTCEMed" pitchFamily="2" charset="0"/>
+            </a:endParaRPr>
           </a:p>
         </p:txBody>
       </p:sp>
@@ -6145,15 +7939,21 @@
           <a:lstStyle/>
           <a:p>
             <a:r>
-              <a:rPr lang="en-US" dirty="0" smtClean="0"/>
+              <a:rPr lang="en-US" dirty="0" smtClean="0">
+                <a:latin typeface="FuturaTCEMed" pitchFamily="2" charset="0"/>
+              </a:rPr>
               <a:t>Introduced in </a:t>
             </a:r>
             <a:r>
-              <a:rPr lang="en-US" dirty="0" err="1" smtClean="0"/>
+              <a:rPr lang="en-US" dirty="0" err="1" smtClean="0">
+                <a:latin typeface="FuturaTCEMed" pitchFamily="2" charset="0"/>
+              </a:rPr>
               <a:t>.Net</a:t>
             </a:r>
             <a:r>
-              <a:rPr lang="en-US" dirty="0" smtClean="0"/>
+              <a:rPr lang="en-US" dirty="0" smtClean="0">
+                <a:latin typeface="FuturaTCEMed" pitchFamily="2" charset="0"/>
+              </a:rPr>
               <a:t> 3.5 and Visual Studio 2008</a:t>
             </a:r>
           </a:p>
@@ -6161,17 +7961,23 @@
             <a:pPr lvl="1">
               <a:buNone/>
             </a:pPr>
-            <a:endParaRPr lang="en-US" dirty="0" smtClean="0"/>
+            <a:endParaRPr lang="en-US" dirty="0" smtClean="0">
+              <a:latin typeface="FuturaTCEMed" pitchFamily="2" charset="0"/>
+            </a:endParaRPr>
           </a:p>
           <a:p>
             <a:pPr lvl="1">
               <a:buNone/>
             </a:pPr>
             <a:r>
-              <a:rPr lang="en-US" dirty="0" smtClean="0"/>
+              <a:rPr lang="en-US" dirty="0" smtClean="0">
+                <a:latin typeface="FuturaTCEMed" pitchFamily="2" charset="0"/>
+              </a:rPr>
               <a:t>Extension methods enable you to "add" methods to existing types without creating a new derived type, recompiling, or otherwise modifying the original type.</a:t>
             </a:r>
-            <a:endParaRPr lang="en-US" dirty="0"/>
+            <a:endParaRPr lang="en-US" dirty="0">
+              <a:latin typeface="FuturaTCEMed" pitchFamily="2" charset="0"/>
+            </a:endParaRPr>
           </a:p>
         </p:txBody>
       </p:sp>
@@ -6180,6 +7986,13 @@
   <p:clrMapOvr>
     <a:masterClrMapping/>
   </p:clrMapOvr>
+  <p:timing>
+    <p:tnLst>
+      <p:par>
+        <p:cTn id="1" dur="indefinite" restart="never" nodeType="tmRoot"/>
+      </p:par>
+    </p:tnLst>
+  </p:timing>
 </p:sld>
 </file>
 
@@ -6354,6 +8167,13 @@
   <p:clrMapOvr>
     <a:masterClrMapping/>
   </p:clrMapOvr>
+  <p:timing>
+    <p:tnLst>
+      <p:par>
+        <p:cTn id="1" dur="indefinite" restart="never" nodeType="tmRoot"/>
+      </p:par>
+    </p:tnLst>
+  </p:timing>
 </p:sld>
 </file>
 
@@ -6414,7 +8234,7 @@
         </p:blipFill>
         <p:spPr bwMode="auto">
           <a:xfrm>
-            <a:off x="1066800" y="1981200"/>
+            <a:off x="990600" y="3200400"/>
             <a:ext cx="6934200" cy="2714625"/>
           </a:xfrm>
           <a:prstGeom prst="rect">
@@ -6439,7 +8259,7 @@
         <p:spPr>
           <a:xfrm>
             <a:off x="609600" y="1524000"/>
-            <a:ext cx="2139817" cy="369332"/>
+            <a:ext cx="4121578" cy="1200329"/>
           </a:xfrm>
           <a:prstGeom prst="rect">
             <a:avLst/>
@@ -6452,24 +8272,58 @@
           </a:bodyPr>
           <a:lstStyle/>
           <a:p>
-            <a:r>
-              <a:rPr lang="en-US" dirty="0" smtClean="0"/>
-              <a:t>1. Make a static class</a:t>
-            </a:r>
+            <a:pPr marL="342900" indent="-342900">
+              <a:buAutoNum type="arabicPeriod"/>
+            </a:pPr>
+            <a:r>
+              <a:rPr lang="en-US" dirty="0" smtClean="0"/>
+              <a:t>Make </a:t>
+            </a:r>
+            <a:r>
+              <a:rPr lang="en-US" dirty="0" smtClean="0"/>
+              <a:t>a static </a:t>
+            </a:r>
+            <a:r>
+              <a:rPr lang="en-US" dirty="0" smtClean="0"/>
+              <a:t>class</a:t>
+            </a:r>
+          </a:p>
+          <a:p>
+            <a:pPr marL="342900" indent="-342900">
+              <a:buAutoNum type="arabicPeriod"/>
+            </a:pPr>
+            <a:r>
+              <a:rPr lang="en-US" dirty="0" smtClean="0"/>
+              <a:t>With a static method</a:t>
+            </a:r>
+          </a:p>
+          <a:p>
+            <a:pPr marL="342900" indent="-342900">
+              <a:buAutoNum type="arabicPeriod"/>
+            </a:pPr>
+            <a:r>
+              <a:rPr lang="en-US" dirty="0" smtClean="0"/>
+              <a:t>First parameter is the object to extend</a:t>
+            </a:r>
+          </a:p>
+          <a:p>
+            <a:pPr marL="342900" indent="-342900">
+              <a:buAutoNum type="arabicPeriod"/>
+            </a:pPr>
             <a:endParaRPr lang="en-US" dirty="0"/>
           </a:p>
         </p:txBody>
       </p:sp>
       <p:sp>
         <p:nvSpPr>
-          <p:cNvPr id="8" name="TextBox 7"/>
+          <p:cNvPr id="7" name="TextBox 6"/>
           <p:cNvSpPr txBox="1"/>
           <p:nvPr/>
         </p:nvSpPr>
         <p:spPr>
           <a:xfrm>
-            <a:off x="5029200" y="1905000"/>
-            <a:ext cx="2376869" cy="369332"/>
+            <a:off x="2514600" y="2743200"/>
+            <a:ext cx="393056" cy="584775"/>
           </a:xfrm>
           <a:prstGeom prst="rect">
             <a:avLst/>
@@ -6483,23 +8337,23 @@
           <a:lstStyle/>
           <a:p>
             <a:r>
-              <a:rPr lang="en-US" dirty="0" smtClean="0"/>
-              <a:t>2. With a static method</a:t>
-            </a:r>
-            <a:endParaRPr lang="en-US" dirty="0"/>
-          </a:p>
-        </p:txBody>
-      </p:sp>
-      <p:sp>
-        <p:nvSpPr>
-          <p:cNvPr id="9" name="TextBox 8"/>
+              <a:rPr lang="en-US" sz="3200" dirty="0" smtClean="0"/>
+              <a:t>1</a:t>
+            </a:r>
+            <a:endParaRPr lang="en-US" sz="3200" dirty="0"/>
+          </a:p>
+        </p:txBody>
+      </p:sp>
+      <p:sp>
+        <p:nvSpPr>
+          <p:cNvPr id="10" name="TextBox 9"/>
           <p:cNvSpPr txBox="1"/>
           <p:nvPr/>
         </p:nvSpPr>
         <p:spPr>
           <a:xfrm>
-            <a:off x="4953000" y="2819400"/>
-            <a:ext cx="4002955" cy="369332"/>
+            <a:off x="1130944" y="3429000"/>
+            <a:ext cx="393056" cy="584775"/>
           </a:xfrm>
           <a:prstGeom prst="rect">
             <a:avLst/>
@@ -6513,10 +8367,40 @@
           <a:lstStyle/>
           <a:p>
             <a:r>
-              <a:rPr lang="en-US" dirty="0" smtClean="0"/>
-              <a:t>3. First parameter is the object to extend</a:t>
-            </a:r>
-            <a:endParaRPr lang="en-US" dirty="0"/>
+              <a:rPr lang="en-US" sz="3200" dirty="0" smtClean="0"/>
+              <a:t>2</a:t>
+            </a:r>
+            <a:endParaRPr lang="en-US" sz="3200" dirty="0"/>
+          </a:p>
+        </p:txBody>
+      </p:sp>
+      <p:sp>
+        <p:nvSpPr>
+          <p:cNvPr id="11" name="TextBox 10"/>
+          <p:cNvSpPr txBox="1"/>
+          <p:nvPr/>
+        </p:nvSpPr>
+        <p:spPr>
+          <a:xfrm>
+            <a:off x="5181600" y="3886200"/>
+            <a:ext cx="393056" cy="584775"/>
+          </a:xfrm>
+          <a:prstGeom prst="rect">
+            <a:avLst/>
+          </a:prstGeom>
+          <a:noFill/>
+        </p:spPr>
+        <p:txBody>
+          <a:bodyPr wrap="none" rtlCol="0">
+            <a:spAutoFit/>
+          </a:bodyPr>
+          <a:lstStyle/>
+          <a:p>
+            <a:r>
+              <a:rPr lang="en-US" sz="3200" dirty="0" smtClean="0"/>
+              <a:t>3</a:t>
+            </a:r>
+            <a:endParaRPr lang="en-US" sz="3200" dirty="0"/>
           </a:p>
         </p:txBody>
       </p:sp>
@@ -6525,6 +8409,13 @@
   <p:clrMapOvr>
     <a:masterClrMapping/>
   </p:clrMapOvr>
+  <p:timing>
+    <p:tnLst>
+      <p:par>
+        <p:cTn id="1" dur="indefinite" restart="never" nodeType="tmRoot"/>
+      </p:par>
+    </p:tnLst>
+  </p:timing>
 </p:sld>
 </file>
 
@@ -6699,6 +8590,13 @@
   <p:clrMapOvr>
     <a:masterClrMapping/>
   </p:clrMapOvr>
+  <p:timing>
+    <p:tnLst>
+      <p:par>
+        <p:cTn id="1" dur="indefinite" restart="never" nodeType="tmRoot"/>
+      </p:par>
+    </p:tnLst>
+  </p:timing>
 </p:sld>
 </file>
 
@@ -6766,6 +8664,13 @@
   <p:clrMapOvr>
     <a:masterClrMapping/>
   </p:clrMapOvr>
+  <p:timing>
+    <p:tnLst>
+      <p:par>
+        <p:cTn id="1" dur="indefinite" restart="never" nodeType="tmRoot"/>
+      </p:par>
+    </p:tnLst>
+  </p:timing>
 </p:sld>
 </file>
 
@@ -6810,74 +8715,16 @@
         <a:srgbClr val="800080"/>
       </a:folHlink>
     </a:clrScheme>
-    <a:fontScheme name="Office">
+    <a:fontScheme name="TechFest">
       <a:majorFont>
-        <a:latin typeface="Calibri"/>
+        <a:latin typeface="FuturaTCEMed"/>
         <a:ea typeface=""/>
         <a:cs typeface=""/>
-        <a:font script="Jpan" typeface="ＭＳ Ｐゴシック"/>
-        <a:font script="Hang" typeface="맑은 고딕"/>
-        <a:font script="Hans" typeface="宋体"/>
-        <a:font script="Hant" typeface="新細明體"/>
-        <a:font script="Arab" typeface="Times New Roman"/>
-        <a:font script="Hebr" typeface="Times New Roman"/>
-        <a:font script="Thai" typeface="Angsana New"/>
-        <a:font script="Ethi" typeface="Nyala"/>
-        <a:font script="Beng" typeface="Vrinda"/>
-        <a:font script="Gujr" typeface="Shruti"/>
-        <a:font script="Khmr" typeface="MoolBoran"/>
-        <a:font script="Knda" typeface="Tunga"/>
-        <a:font script="Guru" typeface="Raavi"/>
-        <a:font script="Cans" typeface="Euphemia"/>
-        <a:font script="Cher" typeface="Plantagenet Cherokee"/>
-        <a:font script="Yiii" typeface="Microsoft Yi Baiti"/>
-        <a:font script="Tibt" typeface="Microsoft Himalaya"/>
-        <a:font script="Thaa" typeface="MV Boli"/>
-        <a:font script="Deva" typeface="Mangal"/>
-        <a:font script="Telu" typeface="Gautami"/>
-        <a:font script="Taml" typeface="Latha"/>
-        <a:font script="Syrc" typeface="Estrangelo Edessa"/>
-        <a:font script="Orya" typeface="Kalinga"/>
-        <a:font script="Mlym" typeface="Kartika"/>
-        <a:font script="Laoo" typeface="DokChampa"/>
-        <a:font script="Sinh" typeface="Iskoola Pota"/>
-        <a:font script="Mong" typeface="Mongolian Baiti"/>
-        <a:font script="Viet" typeface="Times New Roman"/>
-        <a:font script="Uigh" typeface="Microsoft Uighur"/>
       </a:majorFont>
       <a:minorFont>
-        <a:latin typeface="Calibri"/>
+        <a:latin typeface="FuturaTCEMed"/>
         <a:ea typeface=""/>
         <a:cs typeface=""/>
-        <a:font script="Jpan" typeface="ＭＳ Ｐゴシック"/>
-        <a:font script="Hang" typeface="맑은 고딕"/>
-        <a:font script="Hans" typeface="宋体"/>
-        <a:font script="Hant" typeface="新細明體"/>
-        <a:font script="Arab" typeface="Arial"/>
-        <a:font script="Hebr" typeface="Arial"/>
-        <a:font script="Thai" typeface="Cordia New"/>
-        <a:font script="Ethi" typeface="Nyala"/>
-        <a:font script="Beng" typeface="Vrinda"/>
-        <a:font script="Gujr" typeface="Shruti"/>
-        <a:font script="Khmr" typeface="DaunPenh"/>
-        <a:font script="Knda" typeface="Tunga"/>
-        <a:font script="Guru" typeface="Raavi"/>
-        <a:font script="Cans" typeface="Euphemia"/>
-        <a:font script="Cher" typeface="Plantagenet Cherokee"/>
-        <a:font script="Yiii" typeface="Microsoft Yi Baiti"/>
-        <a:font script="Tibt" typeface="Microsoft Himalaya"/>
-        <a:font script="Thaa" typeface="MV Boli"/>
-        <a:font script="Deva" typeface="Mangal"/>
-        <a:font script="Telu" typeface="Gautami"/>
-        <a:font script="Taml" typeface="Latha"/>
-        <a:font script="Syrc" typeface="Estrangelo Edessa"/>
-        <a:font script="Orya" typeface="Kalinga"/>
-        <a:font script="Mlym" typeface="Kartika"/>
-        <a:font script="Laoo" typeface="DokChampa"/>
-        <a:font script="Sinh" typeface="Iskoola Pota"/>
-        <a:font script="Mong" typeface="Mongolian Baiti"/>
-        <a:font script="Viet" typeface="Arial"/>
-        <a:font script="Uigh" typeface="Microsoft Uighur"/>
       </a:minorFont>
     </a:fontScheme>
     <a:fmtScheme name="Office">

</xml_diff>